<commit_message>
1. Deleted old slides from presentation 2. Updated Brochure files with layar logo
</commit_message>
<xml_diff>
--- a/Assignments/Presentations/2015.05.20Presentation_2.pptx
+++ b/Assignments/Presentations/2015.05.20Presentation_2.pptx
@@ -5,7 +5,7 @@
     <p:sldMasterId id="2147483696" r:id="rId1"/>
   </p:sldMasterIdLst>
   <p:notesMasterIdLst>
-    <p:notesMasterId r:id="rId12"/>
+    <p:notesMasterId r:id="rId11"/>
   </p:notesMasterIdLst>
   <p:sldIdLst>
     <p:sldId id="285" r:id="rId2"/>
@@ -17,7 +17,6 @@
     <p:sldId id="296" r:id="rId8"/>
     <p:sldId id="293" r:id="rId9"/>
     <p:sldId id="295" r:id="rId10"/>
-    <p:sldId id="294" r:id="rId11"/>
   </p:sldIdLst>
   <p:sldSz cx="12192000" cy="6858000"/>
   <p:notesSz cx="6858000" cy="9144000"/>
@@ -133,1197 +132,6 @@
     </p:ext>
   </p:extLst>
 </p:presentation>
-</file>
-
-<file path=ppt/charts/chart1.xml><?xml version="1.0" encoding="utf-8"?>
-<c:chartSpace xmlns:c="http://schemas.openxmlformats.org/drawingml/2006/chart" xmlns:a="http://schemas.openxmlformats.org/drawingml/2006/main" xmlns:r="http://schemas.openxmlformats.org/officeDocument/2006/relationships">
-  <c:date1904 val="0"/>
-  <c:lang val="en-US"/>
-  <c:roundedCorners val="0"/>
-  <mc:AlternateContent xmlns:mc="http://schemas.openxmlformats.org/markup-compatibility/2006">
-    <mc:Choice xmlns:c14="http://schemas.microsoft.com/office/drawing/2007/8/2/chart" Requires="c14">
-      <c14:style val="101"/>
-    </mc:Choice>
-    <mc:Fallback>
-      <c:style val="1"/>
-    </mc:Fallback>
-  </mc:AlternateContent>
-  <c:chart>
-    <c:autoTitleDeleted val="1"/>
-    <c:plotArea>
-      <c:layout/>
-      <c:barChart>
-        <c:barDir val="bar"/>
-        <c:grouping val="percentStacked"/>
-        <c:varyColors val="0"/>
-        <c:ser>
-          <c:idx val="0"/>
-          <c:order val="0"/>
-          <c:spPr>
-            <a:solidFill>
-              <a:schemeClr val="dk1">
-                <a:tint val="88500"/>
-              </a:schemeClr>
-            </a:solidFill>
-            <a:ln>
-              <a:noFill/>
-            </a:ln>
-            <a:effectLst/>
-          </c:spPr>
-          <c:invertIfNegative val="0"/>
-          <c:dLbls>
-            <c:spPr>
-              <a:noFill/>
-              <a:ln>
-                <a:noFill/>
-              </a:ln>
-              <a:effectLst/>
-            </c:spPr>
-            <c:txPr>
-              <a:bodyPr rot="0" spcFirstLastPara="1" vertOverflow="ellipsis" vert="horz" wrap="square" lIns="38100" tIns="19050" rIns="38100" bIns="19050" anchor="ctr" anchorCtr="1">
-                <a:spAutoFit/>
-              </a:bodyPr>
-              <a:lstStyle/>
-              <a:p>
-                <a:pPr>
-                  <a:defRPr sz="1197" b="0" i="0" u="none" strike="noStrike" kern="1200" baseline="0">
-                    <a:solidFill>
-                      <a:schemeClr val="tx1">
-                        <a:lumMod val="75000"/>
-                        <a:lumOff val="25000"/>
-                      </a:schemeClr>
-                    </a:solidFill>
-                    <a:latin typeface="+mn-lt"/>
-                    <a:ea typeface="+mn-ea"/>
-                    <a:cs typeface="+mn-cs"/>
-                  </a:defRPr>
-                </a:pPr>
-                <a:endParaRPr lang="en-US"/>
-              </a:p>
-            </c:txPr>
-            <c:dLblPos val="ctr"/>
-            <c:showLegendKey val="0"/>
-            <c:showVal val="1"/>
-            <c:showCatName val="0"/>
-            <c:showSerName val="0"/>
-            <c:showPercent val="0"/>
-            <c:showBubbleSize val="0"/>
-            <c:showLeaderLines val="0"/>
-            <c:extLst>
-              <c:ext xmlns:c15="http://schemas.microsoft.com/office/drawing/2012/chart" uri="{CE6537A1-D6FC-4f65-9D91-7224C49458BB}">
-                <c15:layout/>
-                <c15:showLeaderLines val="1"/>
-                <c15:leaderLines>
-                  <c:spPr>
-                    <a:ln w="9525" cap="flat" cmpd="sng" algn="ctr">
-                      <a:solidFill>
-                        <a:schemeClr val="tx1">
-                          <a:lumMod val="35000"/>
-                          <a:lumOff val="65000"/>
-                        </a:schemeClr>
-                      </a:solidFill>
-                      <a:round/>
-                    </a:ln>
-                    <a:effectLst/>
-                  </c:spPr>
-                </c15:leaderLines>
-              </c:ext>
-            </c:extLst>
-          </c:dLbls>
-          <c:val>
-            <c:numRef>
-              <c:f>Sheet1!$B$2:$B$7</c:f>
-              <c:numCache>
-                <c:formatCode>General</c:formatCode>
-                <c:ptCount val="6"/>
-                <c:pt idx="0">
-                  <c:v>95</c:v>
-                </c:pt>
-                <c:pt idx="1">
-                  <c:v>85</c:v>
-                </c:pt>
-                <c:pt idx="2">
-                  <c:v>3.5</c:v>
-                </c:pt>
-                <c:pt idx="3">
-                  <c:v>4.5</c:v>
-                </c:pt>
-              </c:numCache>
-            </c:numRef>
-          </c:val>
-          <c:extLst>
-            <c:ext xmlns:c15="http://schemas.microsoft.com/office/drawing/2012/chart" uri="{02D57815-91ED-43cb-92C2-25804820EDAC}">
-              <c15:filteredSeriesTitle>
-                <c15:tx>
-                  <c:strRef>
-                    <c:extLst>
-                      <c:ext uri="{02D57815-91ED-43cb-92C2-25804820EDAC}">
-                        <c15:formulaRef>
-                          <c15:sqref>Sheet1!$B$1</c15:sqref>
-                        </c15:formulaRef>
-                      </c:ext>
-                    </c:extLst>
-                    <c:strCache>
-                      <c:ptCount val="1"/>
-                      <c:pt idx="0">
-                        <c:v>Completed</c:v>
-                      </c:pt>
-                    </c:strCache>
-                  </c:strRef>
-                </c15:tx>
-              </c15:filteredSeriesTitle>
-            </c:ext>
-            <c:ext xmlns:c15="http://schemas.microsoft.com/office/drawing/2012/chart" uri="{02D57815-91ED-43cb-92C2-25804820EDAC}">
-              <c15:filteredCategoryTitle>
-                <c15:cat>
-                  <c:strRef>
-                    <c:extLst>
-                      <c:ext uri="{02D57815-91ED-43cb-92C2-25804820EDAC}">
-                        <c15:formulaRef>
-                          <c15:sqref>Sheet1!$A$2:$A$7</c15:sqref>
-                        </c15:formulaRef>
-                      </c:ext>
-                    </c:extLst>
-                    <c:strCache>
-                      <c:ptCount val="6"/>
-                      <c:pt idx="0">
-                        <c:v>Future Perspectives</c:v>
-                      </c:pt>
-                      <c:pt idx="1">
-                        <c:v>Comparison to other technologies</c:v>
-                      </c:pt>
-                      <c:pt idx="2">
-                        <c:v>Law and Governmental Regulations</c:v>
-                      </c:pt>
-                      <c:pt idx="3">
-                        <c:v>Market Perspectives</c:v>
-                      </c:pt>
-                      <c:pt idx="4">
-                        <c:v>Product Perspectives</c:v>
-                      </c:pt>
-                      <c:pt idx="5">
-                        <c:v>Introduction</c:v>
-                      </c:pt>
-                    </c:strCache>
-                  </c:strRef>
-                </c15:cat>
-              </c15:filteredCategoryTitle>
-            </c:ext>
-          </c:extLst>
-        </c:ser>
-        <c:ser>
-          <c:idx val="1"/>
-          <c:order val="1"/>
-          <c:spPr>
-            <a:solidFill>
-              <a:schemeClr val="dk1">
-                <a:tint val="55000"/>
-              </a:schemeClr>
-            </a:solidFill>
-            <a:ln>
-              <a:noFill/>
-            </a:ln>
-            <a:effectLst/>
-          </c:spPr>
-          <c:invertIfNegative val="0"/>
-          <c:dLbls>
-            <c:spPr>
-              <a:noFill/>
-              <a:ln>
-                <a:noFill/>
-              </a:ln>
-              <a:effectLst/>
-            </c:spPr>
-            <c:txPr>
-              <a:bodyPr rot="0" spcFirstLastPara="1" vertOverflow="ellipsis" vert="horz" wrap="square" lIns="38100" tIns="19050" rIns="38100" bIns="19050" anchor="ctr" anchorCtr="1">
-                <a:spAutoFit/>
-              </a:bodyPr>
-              <a:lstStyle/>
-              <a:p>
-                <a:pPr>
-                  <a:defRPr sz="1197" b="0" i="0" u="none" strike="noStrike" kern="1200" baseline="0">
-                    <a:solidFill>
-                      <a:schemeClr val="tx1">
-                        <a:lumMod val="75000"/>
-                        <a:lumOff val="25000"/>
-                      </a:schemeClr>
-                    </a:solidFill>
-                    <a:latin typeface="+mn-lt"/>
-                    <a:ea typeface="+mn-ea"/>
-                    <a:cs typeface="+mn-cs"/>
-                  </a:defRPr>
-                </a:pPr>
-                <a:endParaRPr lang="en-US"/>
-              </a:p>
-            </c:txPr>
-            <c:dLblPos val="ctr"/>
-            <c:showLegendKey val="0"/>
-            <c:showVal val="1"/>
-            <c:showCatName val="0"/>
-            <c:showSerName val="0"/>
-            <c:showPercent val="0"/>
-            <c:showBubbleSize val="0"/>
-            <c:showLeaderLines val="0"/>
-            <c:extLst>
-              <c:ext xmlns:c15="http://schemas.microsoft.com/office/drawing/2012/chart" uri="{CE6537A1-D6FC-4f65-9D91-7224C49458BB}">
-                <c15:layout/>
-                <c15:showLeaderLines val="1"/>
-                <c15:leaderLines>
-                  <c:spPr>
-                    <a:ln w="9525" cap="flat" cmpd="sng" algn="ctr">
-                      <a:solidFill>
-                        <a:schemeClr val="tx1">
-                          <a:lumMod val="35000"/>
-                          <a:lumOff val="65000"/>
-                        </a:schemeClr>
-                      </a:solidFill>
-                      <a:round/>
-                    </a:ln>
-                    <a:effectLst/>
-                  </c:spPr>
-                </c15:leaderLines>
-              </c:ext>
-            </c:extLst>
-          </c:dLbls>
-          <c:val>
-            <c:numRef>
-              <c:f>Sheet1!$C$2:$C$7</c:f>
-              <c:numCache>
-                <c:formatCode>General</c:formatCode>
-                <c:ptCount val="6"/>
-                <c:pt idx="0">
-                  <c:v>5</c:v>
-                </c:pt>
-                <c:pt idx="1">
-                  <c:v>15</c:v>
-                </c:pt>
-                <c:pt idx="2">
-                  <c:v>1.8</c:v>
-                </c:pt>
-                <c:pt idx="3">
-                  <c:v>2.8</c:v>
-                </c:pt>
-              </c:numCache>
-            </c:numRef>
-          </c:val>
-          <c:extLst>
-            <c:ext xmlns:c15="http://schemas.microsoft.com/office/drawing/2012/chart" uri="{02D57815-91ED-43cb-92C2-25804820EDAC}">
-              <c15:filteredSeriesTitle>
-                <c15:tx>
-                  <c:strRef>
-                    <c:extLst>
-                      <c:ext uri="{02D57815-91ED-43cb-92C2-25804820EDAC}">
-                        <c15:formulaRef>
-                          <c15:sqref>Sheet1!$C$1</c15:sqref>
-                        </c15:formulaRef>
-                      </c:ext>
-                    </c:extLst>
-                    <c:strCache>
-                      <c:ptCount val="1"/>
-                      <c:pt idx="0">
-                        <c:v>InProgress</c:v>
-                      </c:pt>
-                    </c:strCache>
-                  </c:strRef>
-                </c15:tx>
-              </c15:filteredSeriesTitle>
-            </c:ext>
-            <c:ext xmlns:c15="http://schemas.microsoft.com/office/drawing/2012/chart" uri="{02D57815-91ED-43cb-92C2-25804820EDAC}">
-              <c15:filteredCategoryTitle>
-                <c15:cat>
-                  <c:strRef>
-                    <c:extLst>
-                      <c:ext uri="{02D57815-91ED-43cb-92C2-25804820EDAC}">
-                        <c15:formulaRef>
-                          <c15:sqref>Sheet1!$A$2:$A$7</c15:sqref>
-                        </c15:formulaRef>
-                      </c:ext>
-                    </c:extLst>
-                    <c:strCache>
-                      <c:ptCount val="6"/>
-                      <c:pt idx="0">
-                        <c:v>Future Perspectives</c:v>
-                      </c:pt>
-                      <c:pt idx="1">
-                        <c:v>Comparison to other technologies</c:v>
-                      </c:pt>
-                      <c:pt idx="2">
-                        <c:v>Law and Governmental Regulations</c:v>
-                      </c:pt>
-                      <c:pt idx="3">
-                        <c:v>Market Perspectives</c:v>
-                      </c:pt>
-                      <c:pt idx="4">
-                        <c:v>Product Perspectives</c:v>
-                      </c:pt>
-                      <c:pt idx="5">
-                        <c:v>Introduction</c:v>
-                      </c:pt>
-                    </c:strCache>
-                  </c:strRef>
-                </c15:cat>
-              </c15:filteredCategoryTitle>
-            </c:ext>
-          </c:extLst>
-        </c:ser>
-        <c:dLbls>
-          <c:dLblPos val="ctr"/>
-          <c:showLegendKey val="0"/>
-          <c:showVal val="1"/>
-          <c:showCatName val="0"/>
-          <c:showSerName val="0"/>
-          <c:showPercent val="0"/>
-          <c:showBubbleSize val="0"/>
-        </c:dLbls>
-        <c:gapWidth val="150"/>
-        <c:overlap val="100"/>
-        <c:axId val="241818752"/>
-        <c:axId val="241817072"/>
-        <c:extLst>
-          <c:ext xmlns:c15="http://schemas.microsoft.com/office/drawing/2012/chart" uri="{02D57815-91ED-43cb-92C2-25804820EDAC}">
-            <c15:filteredBarSeries>
-              <c15:ser>
-                <c:idx val="2"/>
-                <c:order val="2"/>
-                <c:spPr>
-                  <a:solidFill>
-                    <a:schemeClr val="dk1">
-                      <a:tint val="75000"/>
-                    </a:schemeClr>
-                  </a:solidFill>
-                  <a:ln>
-                    <a:noFill/>
-                  </a:ln>
-                  <a:effectLst/>
-                </c:spPr>
-                <c:invertIfNegative val="0"/>
-                <c:dLbls>
-                  <c:spPr>
-                    <a:noFill/>
-                    <a:ln>
-                      <a:noFill/>
-                    </a:ln>
-                    <a:effectLst/>
-                  </c:spPr>
-                  <c:txPr>
-                    <a:bodyPr rot="0" spcFirstLastPara="1" vertOverflow="ellipsis" vert="horz" wrap="square" lIns="38100" tIns="19050" rIns="38100" bIns="19050" anchor="ctr" anchorCtr="1">
-                      <a:spAutoFit/>
-                    </a:bodyPr>
-                    <a:lstStyle/>
-                    <a:p>
-                      <a:pPr>
-                        <a:defRPr sz="1197" b="0" i="0" u="none" strike="noStrike" kern="1200" baseline="0">
-                          <a:solidFill>
-                            <a:schemeClr val="tx1">
-                              <a:lumMod val="75000"/>
-                              <a:lumOff val="25000"/>
-                            </a:schemeClr>
-                          </a:solidFill>
-                          <a:latin typeface="+mn-lt"/>
-                          <a:ea typeface="+mn-ea"/>
-                          <a:cs typeface="+mn-cs"/>
-                        </a:defRPr>
-                      </a:pPr>
-                      <a:endParaRPr lang="en-US"/>
-                    </a:p>
-                  </c:txPr>
-                  <c:dLblPos val="ctr"/>
-                  <c:showLegendKey val="0"/>
-                  <c:showVal val="1"/>
-                  <c:showCatName val="0"/>
-                  <c:showSerName val="0"/>
-                  <c:showPercent val="0"/>
-                  <c:showBubbleSize val="0"/>
-                  <c:showLeaderLines val="0"/>
-                  <c:extLst>
-                    <c:ext uri="{CE6537A1-D6FC-4f65-9D91-7224C49458BB}">
-                      <c15:showLeaderLines val="1"/>
-                      <c15:leaderLines>
-                        <c:spPr>
-                          <a:ln w="9525" cap="flat" cmpd="sng" algn="ctr">
-                            <a:solidFill>
-                              <a:schemeClr val="tx1">
-                                <a:lumMod val="35000"/>
-                                <a:lumOff val="65000"/>
-                              </a:schemeClr>
-                            </a:solidFill>
-                            <a:round/>
-                          </a:ln>
-                          <a:effectLst/>
-                        </c:spPr>
-                      </c15:leaderLines>
-                    </c:ext>
-                  </c:extLst>
-                </c:dLbls>
-                <c:val>
-                  <c:numRef>
-                    <c:extLst>
-                      <c:ext uri="{02D57815-91ED-43cb-92C2-25804820EDAC}">
-                        <c15:formulaRef>
-                          <c15:sqref>Sheet1!$D$2:$D$7</c15:sqref>
-                        </c15:formulaRef>
-                      </c:ext>
-                    </c:extLst>
-                    <c:numCache>
-                      <c:formatCode>General</c:formatCode>
-                      <c:ptCount val="6"/>
-                    </c:numCache>
-                  </c:numRef>
-                </c:val>
-                <c:extLst>
-                  <c:ext uri="{02D57815-91ED-43cb-92C2-25804820EDAC}">
-                    <c15:filteredSeriesTitle>
-                      <c15:tx>
-                        <c:strRef>
-                          <c:extLst>
-                            <c:ext uri="{02D57815-91ED-43cb-92C2-25804820EDAC}">
-                              <c15:formulaRef>
-                                <c15:sqref>Sheet1!$D$1</c15:sqref>
-                              </c15:formulaRef>
-                            </c:ext>
-                          </c:extLst>
-                          <c:strCache>
-                            <c:ptCount val="1"/>
-                            <c:pt idx="0">
-                              <c:v>Column1</c:v>
-                            </c:pt>
-                          </c:strCache>
-                        </c:strRef>
-                      </c15:tx>
-                    </c15:filteredSeriesTitle>
-                  </c:ext>
-                  <c:ext uri="{02D57815-91ED-43cb-92C2-25804820EDAC}">
-                    <c15:filteredCategoryTitle>
-                      <c15:cat>
-                        <c:strRef>
-                          <c:extLst>
-                            <c:ext uri="{02D57815-91ED-43cb-92C2-25804820EDAC}">
-                              <c15:formulaRef>
-                                <c15:sqref>Sheet1!$A$2:$A$7</c15:sqref>
-                              </c15:formulaRef>
-                            </c:ext>
-                          </c:extLst>
-                          <c:strCache>
-                            <c:ptCount val="6"/>
-                            <c:pt idx="0">
-                              <c:v>Future Perspectives</c:v>
-                            </c:pt>
-                            <c:pt idx="1">
-                              <c:v>Comparison to other technologies</c:v>
-                            </c:pt>
-                            <c:pt idx="2">
-                              <c:v>Law and Governmental Regulations</c:v>
-                            </c:pt>
-                            <c:pt idx="3">
-                              <c:v>Market Perspectives</c:v>
-                            </c:pt>
-                            <c:pt idx="4">
-                              <c:v>Product Perspectives</c:v>
-                            </c:pt>
-                            <c:pt idx="5">
-                              <c:v>Introduction</c:v>
-                            </c:pt>
-                          </c:strCache>
-                        </c:strRef>
-                      </c15:cat>
-                    </c15:filteredCategoryTitle>
-                  </c:ext>
-                </c:extLst>
-              </c15:ser>
-            </c15:filteredBarSeries>
-          </c:ext>
-        </c:extLst>
-      </c:barChart>
-      <c:catAx>
-        <c:axId val="241818752"/>
-        <c:scaling>
-          <c:orientation val="minMax"/>
-        </c:scaling>
-        <c:delete val="0"/>
-        <c:axPos val="l"/>
-        <c:numFmt formatCode="General" sourceLinked="1"/>
-        <c:majorTickMark val="none"/>
-        <c:minorTickMark val="none"/>
-        <c:tickLblPos val="nextTo"/>
-        <c:spPr>
-          <a:noFill/>
-          <a:ln w="9525" cap="flat" cmpd="sng" algn="ctr">
-            <a:solidFill>
-              <a:schemeClr val="tx1">
-                <a:lumMod val="15000"/>
-                <a:lumOff val="85000"/>
-              </a:schemeClr>
-            </a:solidFill>
-            <a:round/>
-          </a:ln>
-          <a:effectLst/>
-        </c:spPr>
-        <c:txPr>
-          <a:bodyPr rot="-60000000" spcFirstLastPara="1" vertOverflow="ellipsis" vert="horz" wrap="square" anchor="ctr" anchorCtr="1"/>
-          <a:lstStyle/>
-          <a:p>
-            <a:pPr>
-              <a:defRPr sz="1197" b="0" i="0" u="none" strike="noStrike" kern="1200" baseline="0">
-                <a:solidFill>
-                  <a:schemeClr val="tx1">
-                    <a:lumMod val="65000"/>
-                    <a:lumOff val="35000"/>
-                  </a:schemeClr>
-                </a:solidFill>
-                <a:latin typeface="+mn-lt"/>
-                <a:ea typeface="+mn-ea"/>
-                <a:cs typeface="+mn-cs"/>
-              </a:defRPr>
-            </a:pPr>
-            <a:endParaRPr lang="en-US"/>
-          </a:p>
-        </c:txPr>
-        <c:crossAx val="241817072"/>
-        <c:crosses val="autoZero"/>
-        <c:auto val="1"/>
-        <c:lblAlgn val="ctr"/>
-        <c:lblOffset val="100"/>
-        <c:noMultiLvlLbl val="0"/>
-      </c:catAx>
-      <c:valAx>
-        <c:axId val="241817072"/>
-        <c:scaling>
-          <c:orientation val="minMax"/>
-        </c:scaling>
-        <c:delete val="0"/>
-        <c:axPos val="b"/>
-        <c:numFmt formatCode="0%" sourceLinked="1"/>
-        <c:majorTickMark val="none"/>
-        <c:minorTickMark val="none"/>
-        <c:tickLblPos val="nextTo"/>
-        <c:spPr>
-          <a:noFill/>
-          <a:ln>
-            <a:noFill/>
-          </a:ln>
-          <a:effectLst/>
-        </c:spPr>
-        <c:txPr>
-          <a:bodyPr rot="-60000000" spcFirstLastPara="1" vertOverflow="ellipsis" vert="horz" wrap="square" anchor="ctr" anchorCtr="1"/>
-          <a:lstStyle/>
-          <a:p>
-            <a:pPr>
-              <a:defRPr sz="1197" b="0" i="0" u="none" strike="noStrike" kern="1200" baseline="0">
-                <a:solidFill>
-                  <a:schemeClr val="tx1">
-                    <a:lumMod val="65000"/>
-                    <a:lumOff val="35000"/>
-                  </a:schemeClr>
-                </a:solidFill>
-                <a:latin typeface="+mn-lt"/>
-                <a:ea typeface="+mn-ea"/>
-                <a:cs typeface="+mn-cs"/>
-              </a:defRPr>
-            </a:pPr>
-            <a:endParaRPr lang="en-US"/>
-          </a:p>
-        </c:txPr>
-        <c:crossAx val="241818752"/>
-        <c:crosses val="autoZero"/>
-        <c:crossBetween val="between"/>
-      </c:valAx>
-      <c:spPr>
-        <a:noFill/>
-        <a:ln>
-          <a:noFill/>
-        </a:ln>
-        <a:effectLst/>
-      </c:spPr>
-    </c:plotArea>
-    <c:legend>
-      <c:legendPos val="b"/>
-      <c:layout/>
-      <c:overlay val="0"/>
-      <c:spPr>
-        <a:noFill/>
-        <a:ln>
-          <a:noFill/>
-        </a:ln>
-        <a:effectLst/>
-      </c:spPr>
-      <c:txPr>
-        <a:bodyPr rot="0" spcFirstLastPara="1" vertOverflow="ellipsis" vert="horz" wrap="square" anchor="ctr" anchorCtr="1"/>
-        <a:lstStyle/>
-        <a:p>
-          <a:pPr>
-            <a:defRPr sz="1197" b="0" i="0" u="none" strike="noStrike" kern="1200" baseline="0">
-              <a:solidFill>
-                <a:schemeClr val="tx1">
-                  <a:lumMod val="65000"/>
-                  <a:lumOff val="35000"/>
-                </a:schemeClr>
-              </a:solidFill>
-              <a:latin typeface="+mn-lt"/>
-              <a:ea typeface="+mn-ea"/>
-              <a:cs typeface="+mn-cs"/>
-            </a:defRPr>
-          </a:pPr>
-          <a:endParaRPr lang="en-US"/>
-        </a:p>
-      </c:txPr>
-    </c:legend>
-    <c:plotVisOnly val="1"/>
-    <c:dispBlanksAs val="gap"/>
-    <c:showDLblsOverMax val="0"/>
-  </c:chart>
-  <c:spPr>
-    <a:noFill/>
-    <a:ln>
-      <a:noFill/>
-    </a:ln>
-    <a:effectLst/>
-  </c:spPr>
-  <c:txPr>
-    <a:bodyPr/>
-    <a:lstStyle/>
-    <a:p>
-      <a:pPr>
-        <a:defRPr/>
-      </a:pPr>
-      <a:endParaRPr lang="en-US"/>
-    </a:p>
-  </c:txPr>
-  <c:externalData r:id="rId3">
-    <c:autoUpdate val="0"/>
-  </c:externalData>
-</c:chartSpace>
-</file>
-
-<file path=ppt/charts/colors1.xml><?xml version="1.0" encoding="utf-8"?>
-<cs:colorStyle xmlns:cs="http://schemas.microsoft.com/office/drawing/2012/chartStyle" xmlns:a="http://schemas.openxmlformats.org/drawingml/2006/main" meth="cycle" id="20">
-  <a:schemeClr val="dk1"/>
-  <cs:variation>
-    <a:tint val="88500"/>
-  </cs:variation>
-  <cs:variation>
-    <a:tint val="55000"/>
-  </cs:variation>
-  <cs:variation>
-    <a:tint val="75000"/>
-  </cs:variation>
-  <cs:variation>
-    <a:tint val="98500"/>
-  </cs:variation>
-  <cs:variation>
-    <a:tint val="30000"/>
-  </cs:variation>
-  <cs:variation>
-    <a:tint val="60000"/>
-  </cs:variation>
-  <cs:variation>
-    <a:tint val="80000"/>
-  </cs:variation>
-</cs:colorStyle>
-</file>
-
-<file path=ppt/charts/style1.xml><?xml version="1.0" encoding="utf-8"?>
-<cs:chartStyle xmlns:cs="http://schemas.microsoft.com/office/drawing/2012/chartStyle" xmlns:a="http://schemas.openxmlformats.org/drawingml/2006/main" id="297">
-  <cs:axisTitle>
-    <cs:lnRef idx="0"/>
-    <cs:fillRef idx="0"/>
-    <cs:effectRef idx="0"/>
-    <cs:fontRef idx="minor">
-      <a:schemeClr val="tx1">
-        <a:lumMod val="65000"/>
-        <a:lumOff val="35000"/>
-      </a:schemeClr>
-    </cs:fontRef>
-    <cs:defRPr sz="1330" kern="1200"/>
-  </cs:axisTitle>
-  <cs:categoryAxis>
-    <cs:lnRef idx="0"/>
-    <cs:fillRef idx="0"/>
-    <cs:effectRef idx="0"/>
-    <cs:fontRef idx="minor">
-      <a:schemeClr val="tx1">
-        <a:lumMod val="65000"/>
-        <a:lumOff val="35000"/>
-      </a:schemeClr>
-    </cs:fontRef>
-    <cs:spPr>
-      <a:ln w="9525" cap="flat" cmpd="sng" algn="ctr">
-        <a:solidFill>
-          <a:schemeClr val="tx1">
-            <a:lumMod val="15000"/>
-            <a:lumOff val="85000"/>
-          </a:schemeClr>
-        </a:solidFill>
-        <a:round/>
-      </a:ln>
-    </cs:spPr>
-    <cs:defRPr sz="1197" kern="1200"/>
-  </cs:categoryAxis>
-  <cs:chartArea mods="allowNoFillOverride allowNoLineOverride">
-    <cs:lnRef idx="0"/>
-    <cs:fillRef idx="0"/>
-    <cs:effectRef idx="0"/>
-    <cs:fontRef idx="minor">
-      <a:schemeClr val="tx1"/>
-    </cs:fontRef>
-    <cs:spPr>
-      <a:solidFill>
-        <a:schemeClr val="bg1"/>
-      </a:solidFill>
-      <a:ln w="9525" cap="flat" cmpd="sng" algn="ctr">
-        <a:solidFill>
-          <a:schemeClr val="tx1">
-            <a:lumMod val="15000"/>
-            <a:lumOff val="85000"/>
-          </a:schemeClr>
-        </a:solidFill>
-        <a:round/>
-      </a:ln>
-    </cs:spPr>
-    <cs:defRPr sz="1330" kern="1200"/>
-  </cs:chartArea>
-  <cs:dataLabel>
-    <cs:lnRef idx="0"/>
-    <cs:fillRef idx="0"/>
-    <cs:effectRef idx="0"/>
-    <cs:fontRef idx="minor">
-      <a:schemeClr val="tx1">
-        <a:lumMod val="75000"/>
-        <a:lumOff val="25000"/>
-      </a:schemeClr>
-    </cs:fontRef>
-    <cs:defRPr sz="1197" kern="1200"/>
-  </cs:dataLabel>
-  <cs:dataLabelCallout>
-    <cs:lnRef idx="0"/>
-    <cs:fillRef idx="0"/>
-    <cs:effectRef idx="0"/>
-    <cs:fontRef idx="minor">
-      <a:schemeClr val="dk1">
-        <a:lumMod val="65000"/>
-        <a:lumOff val="35000"/>
-      </a:schemeClr>
-    </cs:fontRef>
-    <cs:spPr>
-      <a:solidFill>
-        <a:schemeClr val="lt1"/>
-      </a:solidFill>
-      <a:ln>
-        <a:solidFill>
-          <a:schemeClr val="dk1">
-            <a:lumMod val="25000"/>
-            <a:lumOff val="75000"/>
-          </a:schemeClr>
-        </a:solidFill>
-      </a:ln>
-    </cs:spPr>
-    <cs:defRPr sz="1197" kern="1200"/>
-    <cs:bodyPr rot="0" spcFirstLastPara="1" vertOverflow="clip" horzOverflow="clip" vert="horz" wrap="square" lIns="36576" tIns="18288" rIns="36576" bIns="18288" anchor="ctr" anchorCtr="1">
-      <a:spAutoFit/>
-    </cs:bodyPr>
-  </cs:dataLabelCallout>
-  <cs:dataPoint>
-    <cs:lnRef idx="0"/>
-    <cs:fillRef idx="1">
-      <cs:styleClr val="auto"/>
-    </cs:fillRef>
-    <cs:effectRef idx="0"/>
-    <cs:fontRef idx="minor">
-      <a:schemeClr val="tx1"/>
-    </cs:fontRef>
-  </cs:dataPoint>
-  <cs:dataPoint3D>
-    <cs:lnRef idx="0"/>
-    <cs:fillRef idx="1">
-      <cs:styleClr val="auto"/>
-    </cs:fillRef>
-    <cs:effectRef idx="0"/>
-    <cs:fontRef idx="minor">
-      <a:schemeClr val="tx1"/>
-    </cs:fontRef>
-  </cs:dataPoint3D>
-  <cs:dataPointLine>
-    <cs:lnRef idx="0">
-      <cs:styleClr val="auto"/>
-    </cs:lnRef>
-    <cs:fillRef idx="1"/>
-    <cs:effectRef idx="0"/>
-    <cs:fontRef idx="minor">
-      <a:schemeClr val="tx1"/>
-    </cs:fontRef>
-    <cs:spPr>
-      <a:ln w="28575" cap="rnd">
-        <a:solidFill>
-          <a:schemeClr val="phClr"/>
-        </a:solidFill>
-        <a:round/>
-      </a:ln>
-    </cs:spPr>
-  </cs:dataPointLine>
-  <cs:dataPointMarker>
-    <cs:lnRef idx="0">
-      <cs:styleClr val="auto"/>
-    </cs:lnRef>
-    <cs:fillRef idx="1">
-      <cs:styleClr val="auto"/>
-    </cs:fillRef>
-    <cs:effectRef idx="0"/>
-    <cs:fontRef idx="minor">
-      <a:schemeClr val="tx1"/>
-    </cs:fontRef>
-    <cs:spPr>
-      <a:ln w="9525">
-        <a:solidFill>
-          <a:schemeClr val="phClr"/>
-        </a:solidFill>
-      </a:ln>
-    </cs:spPr>
-  </cs:dataPointMarker>
-  <cs:dataPointMarkerLayout symbol="circle" size="5"/>
-  <cs:dataPointWireframe>
-    <cs:lnRef idx="0">
-      <cs:styleClr val="auto"/>
-    </cs:lnRef>
-    <cs:fillRef idx="1"/>
-    <cs:effectRef idx="0"/>
-    <cs:fontRef idx="minor">
-      <a:schemeClr val="tx1"/>
-    </cs:fontRef>
-    <cs:spPr>
-      <a:ln w="9525" cap="rnd">
-        <a:solidFill>
-          <a:schemeClr val="phClr"/>
-        </a:solidFill>
-        <a:round/>
-      </a:ln>
-    </cs:spPr>
-  </cs:dataPointWireframe>
-  <cs:dataTable>
-    <cs:lnRef idx="0"/>
-    <cs:fillRef idx="0"/>
-    <cs:effectRef idx="0"/>
-    <cs:fontRef idx="minor">
-      <a:schemeClr val="tx1">
-        <a:lumMod val="65000"/>
-        <a:lumOff val="35000"/>
-      </a:schemeClr>
-    </cs:fontRef>
-    <cs:spPr>
-      <a:noFill/>
-      <a:ln w="9525" cap="flat" cmpd="sng" algn="ctr">
-        <a:solidFill>
-          <a:schemeClr val="tx1">
-            <a:lumMod val="15000"/>
-            <a:lumOff val="85000"/>
-          </a:schemeClr>
-        </a:solidFill>
-        <a:round/>
-      </a:ln>
-    </cs:spPr>
-    <cs:defRPr sz="1197" kern="1200"/>
-  </cs:dataTable>
-  <cs:downBar>
-    <cs:lnRef idx="0"/>
-    <cs:fillRef idx="0"/>
-    <cs:effectRef idx="0"/>
-    <cs:fontRef idx="minor">
-      <a:schemeClr val="tx1"/>
-    </cs:fontRef>
-    <cs:spPr>
-      <a:solidFill>
-        <a:schemeClr val="dk1">
-          <a:lumMod val="75000"/>
-          <a:lumOff val="25000"/>
-        </a:schemeClr>
-      </a:solidFill>
-      <a:ln w="9525" cap="flat" cmpd="sng" algn="ctr">
-        <a:solidFill>
-          <a:schemeClr val="tx1">
-            <a:lumMod val="65000"/>
-            <a:lumOff val="35000"/>
-          </a:schemeClr>
-        </a:solidFill>
-        <a:round/>
-      </a:ln>
-    </cs:spPr>
-  </cs:downBar>
-  <cs:dropLine>
-    <cs:lnRef idx="0"/>
-    <cs:fillRef idx="0"/>
-    <cs:effectRef idx="0"/>
-    <cs:fontRef idx="minor">
-      <a:schemeClr val="tx1"/>
-    </cs:fontRef>
-    <cs:spPr>
-      <a:ln w="9525" cap="flat" cmpd="sng" algn="ctr">
-        <a:solidFill>
-          <a:schemeClr val="tx1">
-            <a:lumMod val="35000"/>
-            <a:lumOff val="65000"/>
-          </a:schemeClr>
-        </a:solidFill>
-        <a:round/>
-      </a:ln>
-    </cs:spPr>
-  </cs:dropLine>
-  <cs:errorBar>
-    <cs:lnRef idx="0"/>
-    <cs:fillRef idx="0"/>
-    <cs:effectRef idx="0"/>
-    <cs:fontRef idx="minor">
-      <a:schemeClr val="tx1"/>
-    </cs:fontRef>
-    <cs:spPr>
-      <a:ln w="9525" cap="flat" cmpd="sng" algn="ctr">
-        <a:solidFill>
-          <a:schemeClr val="tx1">
-            <a:lumMod val="65000"/>
-            <a:lumOff val="35000"/>
-          </a:schemeClr>
-        </a:solidFill>
-        <a:round/>
-      </a:ln>
-    </cs:spPr>
-  </cs:errorBar>
-  <cs:floor>
-    <cs:lnRef idx="0"/>
-    <cs:fillRef idx="0"/>
-    <cs:effectRef idx="0"/>
-    <cs:fontRef idx="minor">
-      <a:schemeClr val="tx1"/>
-    </cs:fontRef>
-    <cs:spPr>
-      <a:noFill/>
-      <a:ln>
-        <a:noFill/>
-      </a:ln>
-    </cs:spPr>
-  </cs:floor>
-  <cs:gridlineMajor>
-    <cs:lnRef idx="0"/>
-    <cs:fillRef idx="0"/>
-    <cs:effectRef idx="0"/>
-    <cs:fontRef idx="minor">
-      <a:schemeClr val="tx1"/>
-    </cs:fontRef>
-    <cs:spPr>
-      <a:ln w="9525" cap="flat" cmpd="sng" algn="ctr">
-        <a:solidFill>
-          <a:schemeClr val="tx1">
-            <a:lumMod val="15000"/>
-            <a:lumOff val="85000"/>
-          </a:schemeClr>
-        </a:solidFill>
-        <a:round/>
-      </a:ln>
-    </cs:spPr>
-  </cs:gridlineMajor>
-  <cs:gridlineMinor>
-    <cs:lnRef idx="0"/>
-    <cs:fillRef idx="0"/>
-    <cs:effectRef idx="0"/>
-    <cs:fontRef idx="minor">
-      <a:schemeClr val="tx1"/>
-    </cs:fontRef>
-    <cs:spPr>
-      <a:ln w="9525" cap="flat" cmpd="sng" algn="ctr">
-        <a:solidFill>
-          <a:schemeClr val="tx1">
-            <a:lumMod val="5000"/>
-            <a:lumOff val="95000"/>
-          </a:schemeClr>
-        </a:solidFill>
-        <a:round/>
-      </a:ln>
-    </cs:spPr>
-  </cs:gridlineMinor>
-  <cs:hiLoLine>
-    <cs:lnRef idx="0"/>
-    <cs:fillRef idx="0"/>
-    <cs:effectRef idx="0"/>
-    <cs:fontRef idx="minor">
-      <a:schemeClr val="tx1"/>
-    </cs:fontRef>
-    <cs:spPr>
-      <a:ln w="9525" cap="flat" cmpd="sng" algn="ctr">
-        <a:solidFill>
-          <a:schemeClr val="tx1">
-            <a:lumMod val="50000"/>
-            <a:lumOff val="50000"/>
-          </a:schemeClr>
-        </a:solidFill>
-        <a:round/>
-      </a:ln>
-    </cs:spPr>
-  </cs:hiLoLine>
-  <cs:leaderLine>
-    <cs:lnRef idx="0"/>
-    <cs:fillRef idx="0"/>
-    <cs:effectRef idx="0"/>
-    <cs:fontRef idx="minor">
-      <a:schemeClr val="tx1"/>
-    </cs:fontRef>
-    <cs:spPr>
-      <a:ln w="9525" cap="flat" cmpd="sng" algn="ctr">
-        <a:solidFill>
-          <a:schemeClr val="tx1">
-            <a:lumMod val="35000"/>
-            <a:lumOff val="65000"/>
-          </a:schemeClr>
-        </a:solidFill>
-        <a:round/>
-      </a:ln>
-    </cs:spPr>
-  </cs:leaderLine>
-  <cs:legend>
-    <cs:lnRef idx="0"/>
-    <cs:fillRef idx="0"/>
-    <cs:effectRef idx="0"/>
-    <cs:fontRef idx="minor">
-      <a:schemeClr val="tx1">
-        <a:lumMod val="65000"/>
-        <a:lumOff val="35000"/>
-      </a:schemeClr>
-    </cs:fontRef>
-    <cs:defRPr sz="1197" kern="1200"/>
-  </cs:legend>
-  <cs:plotArea mods="allowNoFillOverride allowNoLineOverride">
-    <cs:lnRef idx="0"/>
-    <cs:fillRef idx="0"/>
-    <cs:effectRef idx="0"/>
-    <cs:fontRef idx="minor">
-      <a:schemeClr val="tx1"/>
-    </cs:fontRef>
-  </cs:plotArea>
-  <cs:plotArea3D mods="allowNoFillOverride allowNoLineOverride">
-    <cs:lnRef idx="0"/>
-    <cs:fillRef idx="0"/>
-    <cs:effectRef idx="0"/>
-    <cs:fontRef idx="minor">
-      <a:schemeClr val="tx1"/>
-    </cs:fontRef>
-  </cs:plotArea3D>
-  <cs:seriesAxis>
-    <cs:lnRef idx="0"/>
-    <cs:fillRef idx="0"/>
-    <cs:effectRef idx="0"/>
-    <cs:fontRef idx="minor">
-      <a:schemeClr val="tx1">
-        <a:lumMod val="65000"/>
-        <a:lumOff val="35000"/>
-      </a:schemeClr>
-    </cs:fontRef>
-    <cs:defRPr sz="1197" kern="1200"/>
-  </cs:seriesAxis>
-  <cs:seriesLine>
-    <cs:lnRef idx="0"/>
-    <cs:fillRef idx="0"/>
-    <cs:effectRef idx="0"/>
-    <cs:fontRef idx="minor">
-      <a:schemeClr val="tx1"/>
-    </cs:fontRef>
-    <cs:spPr>
-      <a:ln w="9525" cap="flat" cmpd="sng" algn="ctr">
-        <a:solidFill>
-          <a:schemeClr val="tx1">
-            <a:lumMod val="35000"/>
-            <a:lumOff val="65000"/>
-          </a:schemeClr>
-        </a:solidFill>
-        <a:round/>
-      </a:ln>
-    </cs:spPr>
-  </cs:seriesLine>
-  <cs:title>
-    <cs:lnRef idx="0"/>
-    <cs:fillRef idx="0"/>
-    <cs:effectRef idx="0"/>
-    <cs:fontRef idx="minor">
-      <a:schemeClr val="tx1">
-        <a:lumMod val="65000"/>
-        <a:lumOff val="35000"/>
-      </a:schemeClr>
-    </cs:fontRef>
-    <cs:defRPr sz="1862" b="0" kern="1200" spc="0" baseline="0"/>
-  </cs:title>
-  <cs:trendline>
-    <cs:lnRef idx="0">
-      <cs:styleClr val="auto"/>
-    </cs:lnRef>
-    <cs:fillRef idx="0"/>
-    <cs:effectRef idx="0"/>
-    <cs:fontRef idx="minor">
-      <a:schemeClr val="tx1"/>
-    </cs:fontRef>
-    <cs:spPr>
-      <a:ln w="19050" cap="rnd">
-        <a:solidFill>
-          <a:schemeClr val="phClr"/>
-        </a:solidFill>
-        <a:prstDash val="sysDot"/>
-      </a:ln>
-    </cs:spPr>
-  </cs:trendline>
-  <cs:trendlineLabel>
-    <cs:lnRef idx="0"/>
-    <cs:fillRef idx="0"/>
-    <cs:effectRef idx="0"/>
-    <cs:fontRef idx="minor">
-      <a:schemeClr val="tx1">
-        <a:lumMod val="65000"/>
-        <a:lumOff val="35000"/>
-      </a:schemeClr>
-    </cs:fontRef>
-    <cs:defRPr sz="1197" kern="1200"/>
-  </cs:trendlineLabel>
-  <cs:upBar>
-    <cs:lnRef idx="0"/>
-    <cs:fillRef idx="0"/>
-    <cs:effectRef idx="0"/>
-    <cs:fontRef idx="minor">
-      <a:schemeClr val="tx1"/>
-    </cs:fontRef>
-    <cs:spPr>
-      <a:solidFill>
-        <a:schemeClr val="lt1"/>
-      </a:solidFill>
-      <a:ln w="9525" cap="flat" cmpd="sng" algn="ctr">
-        <a:solidFill>
-          <a:schemeClr val="tx1">
-            <a:lumMod val="65000"/>
-            <a:lumOff val="35000"/>
-          </a:schemeClr>
-        </a:solidFill>
-        <a:round/>
-      </a:ln>
-    </cs:spPr>
-  </cs:upBar>
-  <cs:valueAxis>
-    <cs:lnRef idx="0"/>
-    <cs:fillRef idx="0"/>
-    <cs:effectRef idx="0"/>
-    <cs:fontRef idx="minor">
-      <a:schemeClr val="tx1">
-        <a:lumMod val="65000"/>
-        <a:lumOff val="35000"/>
-      </a:schemeClr>
-    </cs:fontRef>
-    <cs:defRPr sz="1197" kern="1200"/>
-  </cs:valueAxis>
-  <cs:wall>
-    <cs:lnRef idx="0"/>
-    <cs:fillRef idx="0"/>
-    <cs:effectRef idx="0"/>
-    <cs:fontRef idx="minor">
-      <a:schemeClr val="tx1"/>
-    </cs:fontRef>
-    <cs:spPr>
-      <a:noFill/>
-      <a:ln>
-        <a:noFill/>
-      </a:ln>
-    </cs:spPr>
-  </cs:wall>
-</cs:chartStyle>
 </file>
 
 <file path=ppt/diagrams/colors1.xml><?xml version="1.0" encoding="utf-8"?>
@@ -3780,966 +2588,6 @@
       <dsp:cNvGrpSpPr/>
     </dsp:nvGrpSpPr>
     <dsp:grpSpPr/>
-    <dsp:sp modelId="{3DD4DCC5-CD2A-4C80-9516-43D7C916D6B5}">
-      <dsp:nvSpPr>
-        <dsp:cNvPr id="0" name=""/>
-        <dsp:cNvSpPr/>
-      </dsp:nvSpPr>
-      <dsp:spPr>
-        <a:xfrm rot="16200000">
-          <a:off x="-306010" y="306010"/>
-          <a:ext cx="2707637" cy="2095616"/>
-        </a:xfrm>
-        <a:prstGeom prst="flowChartManualOperation">
-          <a:avLst/>
-        </a:prstGeom>
-        <a:solidFill>
-          <a:schemeClr val="lt1">
-            <a:hueOff val="0"/>
-            <a:satOff val="0"/>
-            <a:lumOff val="0"/>
-            <a:alphaOff val="0"/>
-          </a:schemeClr>
-        </a:solidFill>
-        <a:ln w="15875" cap="flat" cmpd="sng" algn="ctr">
-          <a:solidFill>
-            <a:schemeClr val="accent3">
-              <a:shade val="80000"/>
-              <a:hueOff val="0"/>
-              <a:satOff val="0"/>
-              <a:lumOff val="0"/>
-              <a:alphaOff val="0"/>
-            </a:schemeClr>
-          </a:solidFill>
-          <a:prstDash val="solid"/>
-        </a:ln>
-        <a:effectLst/>
-      </dsp:spPr>
-      <dsp:style>
-        <a:lnRef idx="2">
-          <a:scrgbClr r="0" g="0" b="0"/>
-        </a:lnRef>
-        <a:fillRef idx="1">
-          <a:scrgbClr r="0" g="0" b="0"/>
-        </a:fillRef>
-        <a:effectRef idx="0">
-          <a:scrgbClr r="0" g="0" b="0"/>
-        </a:effectRef>
-        <a:fontRef idx="minor">
-          <a:schemeClr val="lt1"/>
-        </a:fontRef>
-      </dsp:style>
-      <dsp:txBody>
-        <a:bodyPr spcFirstLastPara="0" vert="horz" wrap="square" lIns="88900" tIns="0" rIns="88900" bIns="0" numCol="1" spcCol="1270" anchor="t" anchorCtr="0">
-          <a:noAutofit/>
-        </a:bodyPr>
-        <a:lstStyle/>
-        <a:p>
-          <a:pPr lvl="0" algn="l" defTabSz="622300">
-            <a:lnSpc>
-              <a:spcPct val="90000"/>
-            </a:lnSpc>
-            <a:spcBef>
-              <a:spcPct val="0"/>
-            </a:spcBef>
-            <a:spcAft>
-              <a:spcPct val="35000"/>
-            </a:spcAft>
-          </a:pPr>
-          <a:r>
-            <a:rPr lang="fr-FR" sz="1400" kern="1200" smtClean="0">
-              <a:solidFill>
-                <a:schemeClr val="accent3">
-                  <a:lumMod val="75000"/>
-                </a:schemeClr>
-              </a:solidFill>
-            </a:rPr>
-            <a:t>RESOURCES</a:t>
-          </a:r>
-          <a:endParaRPr lang="fr-FR" sz="1400" kern="1200" dirty="0">
-            <a:solidFill>
-              <a:schemeClr val="accent3">
-                <a:lumMod val="75000"/>
-              </a:schemeClr>
-            </a:solidFill>
-          </a:endParaRPr>
-        </a:p>
-        <a:p>
-          <a:pPr marL="57150" lvl="1" indent="-57150" algn="l" defTabSz="466725">
-            <a:lnSpc>
-              <a:spcPct val="90000"/>
-            </a:lnSpc>
-            <a:spcBef>
-              <a:spcPct val="0"/>
-            </a:spcBef>
-            <a:spcAft>
-              <a:spcPct val="15000"/>
-            </a:spcAft>
-            <a:buChar char="••"/>
-          </a:pPr>
-          <a:r>
-            <a:rPr lang="fr-FR" sz="1050" kern="1200" smtClean="0">
-              <a:solidFill>
-                <a:schemeClr val="accent3">
-                  <a:lumMod val="75000"/>
-                </a:schemeClr>
-              </a:solidFill>
-            </a:rPr>
-            <a:t>1 Supervisor</a:t>
-          </a:r>
-          <a:endParaRPr lang="fr-FR" sz="1050" kern="1200">
-            <a:solidFill>
-              <a:schemeClr val="accent3">
-                <a:lumMod val="75000"/>
-              </a:schemeClr>
-            </a:solidFill>
-          </a:endParaRPr>
-        </a:p>
-        <a:p>
-          <a:pPr marL="57150" lvl="1" indent="-57150" algn="l" defTabSz="466725">
-            <a:lnSpc>
-              <a:spcPct val="90000"/>
-            </a:lnSpc>
-            <a:spcBef>
-              <a:spcPct val="0"/>
-            </a:spcBef>
-            <a:spcAft>
-              <a:spcPct val="15000"/>
-            </a:spcAft>
-            <a:buChar char="••"/>
-          </a:pPr>
-          <a:r>
-            <a:rPr lang="fr-FR" sz="1050" kern="1200" smtClean="0">
-              <a:solidFill>
-                <a:schemeClr val="accent3">
-                  <a:lumMod val="75000"/>
-                </a:schemeClr>
-              </a:solidFill>
-            </a:rPr>
-            <a:t>20 Contributors</a:t>
-          </a:r>
-          <a:endParaRPr lang="fr-FR" sz="1050" kern="1200" dirty="0">
-            <a:solidFill>
-              <a:schemeClr val="accent3">
-                <a:lumMod val="75000"/>
-              </a:schemeClr>
-            </a:solidFill>
-          </a:endParaRPr>
-        </a:p>
-        <a:p>
-          <a:pPr marL="57150" lvl="1" indent="-57150" algn="l" defTabSz="466725">
-            <a:lnSpc>
-              <a:spcPct val="90000"/>
-            </a:lnSpc>
-            <a:spcBef>
-              <a:spcPct val="0"/>
-            </a:spcBef>
-            <a:spcAft>
-              <a:spcPct val="15000"/>
-            </a:spcAft>
-            <a:buChar char="••"/>
-          </a:pPr>
-          <a:r>
-            <a:rPr lang="fr-FR" sz="1050" kern="1200" smtClean="0">
-              <a:solidFill>
-                <a:schemeClr val="accent3">
-                  <a:lumMod val="75000"/>
-                </a:schemeClr>
-              </a:solidFill>
-            </a:rPr>
-            <a:t>4 Authors</a:t>
-          </a:r>
-          <a:endParaRPr lang="fr-FR" sz="1050" kern="1200" dirty="0">
-            <a:solidFill>
-              <a:schemeClr val="accent3">
-                <a:lumMod val="75000"/>
-              </a:schemeClr>
-            </a:solidFill>
-          </a:endParaRPr>
-        </a:p>
-        <a:p>
-          <a:pPr marL="57150" lvl="1" indent="-57150" algn="l" defTabSz="466725">
-            <a:lnSpc>
-              <a:spcPct val="90000"/>
-            </a:lnSpc>
-            <a:spcBef>
-              <a:spcPct val="0"/>
-            </a:spcBef>
-            <a:spcAft>
-              <a:spcPct val="15000"/>
-            </a:spcAft>
-            <a:buChar char="••"/>
-          </a:pPr>
-          <a:r>
-            <a:rPr lang="fr-FR" sz="1050" kern="1200" smtClean="0">
-              <a:solidFill>
-                <a:schemeClr val="accent3">
-                  <a:lumMod val="75000"/>
-                </a:schemeClr>
-              </a:solidFill>
-            </a:rPr>
-            <a:t>Documetation anout IAR</a:t>
-          </a:r>
-          <a:endParaRPr lang="fr-FR" sz="1050" kern="1200">
-            <a:solidFill>
-              <a:schemeClr val="accent3">
-                <a:lumMod val="75000"/>
-              </a:schemeClr>
-            </a:solidFill>
-          </a:endParaRPr>
-        </a:p>
-        <a:p>
-          <a:pPr marL="57150" lvl="1" indent="-57150" algn="l" defTabSz="466725">
-            <a:lnSpc>
-              <a:spcPct val="90000"/>
-            </a:lnSpc>
-            <a:spcBef>
-              <a:spcPct val="0"/>
-            </a:spcBef>
-            <a:spcAft>
-              <a:spcPct val="15000"/>
-            </a:spcAft>
-            <a:buChar char="••"/>
-          </a:pPr>
-          <a:r>
-            <a:rPr lang="fr-FR" sz="1050" kern="1200" smtClean="0">
-              <a:solidFill>
-                <a:schemeClr val="accent3">
-                  <a:lumMod val="75000"/>
-                </a:schemeClr>
-              </a:solidFill>
-            </a:rPr>
-            <a:t>Documentation about Fuel Cells</a:t>
-          </a:r>
-          <a:endParaRPr lang="fr-FR" sz="1050" kern="1200">
-            <a:solidFill>
-              <a:schemeClr val="accent3">
-                <a:lumMod val="75000"/>
-              </a:schemeClr>
-            </a:solidFill>
-          </a:endParaRPr>
-        </a:p>
-        <a:p>
-          <a:pPr marL="57150" lvl="1" indent="-57150" algn="l" defTabSz="466725">
-            <a:lnSpc>
-              <a:spcPct val="90000"/>
-            </a:lnSpc>
-            <a:spcBef>
-              <a:spcPct val="0"/>
-            </a:spcBef>
-            <a:spcAft>
-              <a:spcPct val="15000"/>
-            </a:spcAft>
-            <a:buChar char="••"/>
-          </a:pPr>
-          <a:r>
-            <a:rPr lang="fr-FR" sz="1050" kern="1200" smtClean="0">
-              <a:solidFill>
-                <a:schemeClr val="accent3">
-                  <a:lumMod val="75000"/>
-                </a:schemeClr>
-              </a:solidFill>
-            </a:rPr>
-            <a:t>Online data sharing platform</a:t>
-          </a:r>
-          <a:endParaRPr lang="fr-FR" sz="1050" kern="1200">
-            <a:solidFill>
-              <a:schemeClr val="accent3">
-                <a:lumMod val="75000"/>
-              </a:schemeClr>
-            </a:solidFill>
-          </a:endParaRPr>
-        </a:p>
-        <a:p>
-          <a:pPr marL="57150" lvl="1" indent="-57150" algn="l" defTabSz="466725">
-            <a:lnSpc>
-              <a:spcPct val="90000"/>
-            </a:lnSpc>
-            <a:spcBef>
-              <a:spcPct val="0"/>
-            </a:spcBef>
-            <a:spcAft>
-              <a:spcPct val="15000"/>
-            </a:spcAft>
-            <a:buChar char="••"/>
-          </a:pPr>
-          <a:endParaRPr lang="fr-FR" sz="1050" kern="1200">
-            <a:solidFill>
-              <a:schemeClr val="accent3">
-                <a:lumMod val="75000"/>
-              </a:schemeClr>
-            </a:solidFill>
-          </a:endParaRPr>
-        </a:p>
-      </dsp:txBody>
-      <dsp:txXfrm rot="5400000">
-        <a:off x="1" y="541526"/>
-        <a:ext cx="2095616" cy="1624583"/>
-      </dsp:txXfrm>
-    </dsp:sp>
-    <dsp:sp modelId="{06BACB2E-25D6-491F-9902-6DE6A89C06CD}">
-      <dsp:nvSpPr>
-        <dsp:cNvPr id="0" name=""/>
-        <dsp:cNvSpPr/>
-      </dsp:nvSpPr>
-      <dsp:spPr>
-        <a:xfrm rot="16200000">
-          <a:off x="1948912" y="306010"/>
-          <a:ext cx="2707637" cy="2095616"/>
-        </a:xfrm>
-        <a:prstGeom prst="flowChartManualOperation">
-          <a:avLst/>
-        </a:prstGeom>
-        <a:solidFill>
-          <a:schemeClr val="lt1">
-            <a:hueOff val="0"/>
-            <a:satOff val="0"/>
-            <a:lumOff val="0"/>
-            <a:alphaOff val="0"/>
-          </a:schemeClr>
-        </a:solidFill>
-        <a:ln w="15875" cap="flat" cmpd="sng" algn="ctr">
-          <a:solidFill>
-            <a:schemeClr val="accent3">
-              <a:shade val="80000"/>
-              <a:hueOff val="0"/>
-              <a:satOff val="0"/>
-              <a:lumOff val="0"/>
-              <a:alphaOff val="0"/>
-            </a:schemeClr>
-          </a:solidFill>
-          <a:prstDash val="solid"/>
-        </a:ln>
-        <a:effectLst/>
-      </dsp:spPr>
-      <dsp:style>
-        <a:lnRef idx="2">
-          <a:scrgbClr r="0" g="0" b="0"/>
-        </a:lnRef>
-        <a:fillRef idx="1">
-          <a:scrgbClr r="0" g="0" b="0"/>
-        </a:fillRef>
-        <a:effectRef idx="0">
-          <a:scrgbClr r="0" g="0" b="0"/>
-        </a:effectRef>
-        <a:fontRef idx="minor">
-          <a:schemeClr val="lt1"/>
-        </a:fontRef>
-      </dsp:style>
-      <dsp:txBody>
-        <a:bodyPr spcFirstLastPara="0" vert="horz" wrap="square" lIns="88900" tIns="0" rIns="88900" bIns="0" numCol="1" spcCol="1270" anchor="t" anchorCtr="0">
-          <a:noAutofit/>
-        </a:bodyPr>
-        <a:lstStyle/>
-        <a:p>
-          <a:pPr lvl="0" algn="l" defTabSz="622300">
-            <a:lnSpc>
-              <a:spcPct val="90000"/>
-            </a:lnSpc>
-            <a:spcBef>
-              <a:spcPct val="0"/>
-            </a:spcBef>
-            <a:spcAft>
-              <a:spcPct val="35000"/>
-            </a:spcAft>
-          </a:pPr>
-          <a:r>
-            <a:rPr lang="fr-FR" sz="1400" kern="1200" smtClean="0">
-              <a:solidFill>
-                <a:schemeClr val="accent3">
-                  <a:lumMod val="75000"/>
-                </a:schemeClr>
-              </a:solidFill>
-            </a:rPr>
-            <a:t>ACTIVITIES</a:t>
-          </a:r>
-          <a:endParaRPr lang="fr-FR" sz="1400" kern="1200">
-            <a:solidFill>
-              <a:schemeClr val="accent3">
-                <a:lumMod val="75000"/>
-              </a:schemeClr>
-            </a:solidFill>
-          </a:endParaRPr>
-        </a:p>
-        <a:p>
-          <a:pPr marL="57150" lvl="1" indent="-57150" algn="l" defTabSz="466725">
-            <a:lnSpc>
-              <a:spcPct val="90000"/>
-            </a:lnSpc>
-            <a:spcBef>
-              <a:spcPct val="0"/>
-            </a:spcBef>
-            <a:spcAft>
-              <a:spcPct val="15000"/>
-            </a:spcAft>
-            <a:buChar char="••"/>
-          </a:pPr>
-          <a:r>
-            <a:rPr lang="fr-FR" sz="1050" kern="1200" smtClean="0">
-              <a:solidFill>
-                <a:schemeClr val="accent3">
-                  <a:lumMod val="75000"/>
-                </a:schemeClr>
-              </a:solidFill>
-            </a:rPr>
-            <a:t>Review Fuel Cell information</a:t>
-          </a:r>
-          <a:endParaRPr lang="fr-FR" sz="1050" kern="1200" dirty="0">
-            <a:solidFill>
-              <a:schemeClr val="accent3">
-                <a:lumMod val="75000"/>
-              </a:schemeClr>
-            </a:solidFill>
-          </a:endParaRPr>
-        </a:p>
-        <a:p>
-          <a:pPr marL="57150" lvl="1" indent="-57150" algn="l" defTabSz="466725">
-            <a:lnSpc>
-              <a:spcPct val="90000"/>
-            </a:lnSpc>
-            <a:spcBef>
-              <a:spcPct val="0"/>
-            </a:spcBef>
-            <a:spcAft>
-              <a:spcPct val="15000"/>
-            </a:spcAft>
-            <a:buChar char="••"/>
-          </a:pPr>
-          <a:r>
-            <a:rPr lang="fr-FR" sz="1050" kern="1200" smtClean="0">
-              <a:solidFill>
-                <a:schemeClr val="accent3">
-                  <a:lumMod val="75000"/>
-                </a:schemeClr>
-              </a:solidFill>
-            </a:rPr>
-            <a:t>Extract IAR structure from existing reports</a:t>
-          </a:r>
-          <a:endParaRPr lang="fr-FR" sz="1050" kern="1200" dirty="0">
-            <a:solidFill>
-              <a:schemeClr val="accent3">
-                <a:lumMod val="75000"/>
-              </a:schemeClr>
-            </a:solidFill>
-          </a:endParaRPr>
-        </a:p>
-        <a:p>
-          <a:pPr marL="57150" lvl="1" indent="-57150" algn="l" defTabSz="466725">
-            <a:lnSpc>
-              <a:spcPct val="90000"/>
-            </a:lnSpc>
-            <a:spcBef>
-              <a:spcPct val="0"/>
-            </a:spcBef>
-            <a:spcAft>
-              <a:spcPct val="15000"/>
-            </a:spcAft>
-            <a:buChar char="••"/>
-          </a:pPr>
-          <a:r>
-            <a:rPr lang="fr-FR" sz="1050" kern="1200" smtClean="0">
-              <a:solidFill>
-                <a:schemeClr val="accent3">
-                  <a:lumMod val="75000"/>
-                </a:schemeClr>
-              </a:solidFill>
-            </a:rPr>
-            <a:t>Build a personalized outline for the IAR</a:t>
-          </a:r>
-          <a:endParaRPr lang="fr-FR" sz="1050" kern="1200">
-            <a:solidFill>
-              <a:schemeClr val="accent3">
-                <a:lumMod val="75000"/>
-              </a:schemeClr>
-            </a:solidFill>
-          </a:endParaRPr>
-        </a:p>
-        <a:p>
-          <a:pPr marL="57150" lvl="1" indent="-57150" algn="l" defTabSz="466725">
-            <a:lnSpc>
-              <a:spcPct val="90000"/>
-            </a:lnSpc>
-            <a:spcBef>
-              <a:spcPct val="0"/>
-            </a:spcBef>
-            <a:spcAft>
-              <a:spcPct val="15000"/>
-            </a:spcAft>
-            <a:buChar char="••"/>
-          </a:pPr>
-          <a:r>
-            <a:rPr lang="fr-FR" sz="1050" kern="1200" smtClean="0">
-              <a:solidFill>
-                <a:schemeClr val="accent3">
-                  <a:lumMod val="75000"/>
-                </a:schemeClr>
-              </a:solidFill>
-            </a:rPr>
-            <a:t>Collect data</a:t>
-          </a:r>
-          <a:endParaRPr lang="fr-FR" sz="1050" kern="1200">
-            <a:solidFill>
-              <a:schemeClr val="accent3">
-                <a:lumMod val="75000"/>
-              </a:schemeClr>
-            </a:solidFill>
-          </a:endParaRPr>
-        </a:p>
-        <a:p>
-          <a:pPr marL="57150" lvl="1" indent="-57150" algn="l" defTabSz="466725">
-            <a:lnSpc>
-              <a:spcPct val="90000"/>
-            </a:lnSpc>
-            <a:spcBef>
-              <a:spcPct val="0"/>
-            </a:spcBef>
-            <a:spcAft>
-              <a:spcPct val="15000"/>
-            </a:spcAft>
-            <a:buChar char="••"/>
-          </a:pPr>
-          <a:r>
-            <a:rPr lang="fr-FR" sz="1050" kern="1200" smtClean="0">
-              <a:solidFill>
-                <a:schemeClr val="accent3">
-                  <a:lumMod val="75000"/>
-                </a:schemeClr>
-              </a:solidFill>
-            </a:rPr>
-            <a:t>Write, design and edit the IAR</a:t>
-          </a:r>
-          <a:endParaRPr lang="fr-FR" sz="1050" kern="1200">
-            <a:solidFill>
-              <a:schemeClr val="accent3">
-                <a:lumMod val="75000"/>
-              </a:schemeClr>
-            </a:solidFill>
-          </a:endParaRPr>
-        </a:p>
-        <a:p>
-          <a:pPr marL="57150" lvl="1" indent="-57150" algn="l" defTabSz="466725">
-            <a:lnSpc>
-              <a:spcPct val="90000"/>
-            </a:lnSpc>
-            <a:spcBef>
-              <a:spcPct val="0"/>
-            </a:spcBef>
-            <a:spcAft>
-              <a:spcPct val="15000"/>
-            </a:spcAft>
-            <a:buChar char="••"/>
-          </a:pPr>
-          <a:r>
-            <a:rPr lang="fr-FR" sz="1050" kern="1200" smtClean="0">
-              <a:solidFill>
-                <a:schemeClr val="accent3">
-                  <a:lumMod val="75000"/>
-                </a:schemeClr>
-              </a:solidFill>
-            </a:rPr>
-            <a:t>Present IAR project</a:t>
-          </a:r>
-          <a:endParaRPr lang="fr-FR" sz="1050" kern="1200">
-            <a:solidFill>
-              <a:schemeClr val="accent3">
-                <a:lumMod val="75000"/>
-              </a:schemeClr>
-            </a:solidFill>
-          </a:endParaRPr>
-        </a:p>
-      </dsp:txBody>
-      <dsp:txXfrm rot="5400000">
-        <a:off x="2254923" y="541526"/>
-        <a:ext cx="2095616" cy="1624583"/>
-      </dsp:txXfrm>
-    </dsp:sp>
-    <dsp:sp modelId="{21D06AF9-7B68-4C50-825D-0A7D198CBF3A}">
-      <dsp:nvSpPr>
-        <dsp:cNvPr id="0" name=""/>
-        <dsp:cNvSpPr/>
-      </dsp:nvSpPr>
-      <dsp:spPr>
-        <a:xfrm rot="16200000">
-          <a:off x="4201699" y="306010"/>
-          <a:ext cx="2707637" cy="2095616"/>
-        </a:xfrm>
-        <a:prstGeom prst="flowChartManualOperation">
-          <a:avLst/>
-        </a:prstGeom>
-        <a:solidFill>
-          <a:schemeClr val="lt1">
-            <a:hueOff val="0"/>
-            <a:satOff val="0"/>
-            <a:lumOff val="0"/>
-            <a:alphaOff val="0"/>
-          </a:schemeClr>
-        </a:solidFill>
-        <a:ln w="15875" cap="flat" cmpd="sng" algn="ctr">
-          <a:solidFill>
-            <a:schemeClr val="accent3">
-              <a:shade val="80000"/>
-              <a:hueOff val="0"/>
-              <a:satOff val="0"/>
-              <a:lumOff val="0"/>
-              <a:alphaOff val="0"/>
-            </a:schemeClr>
-          </a:solidFill>
-          <a:prstDash val="solid"/>
-        </a:ln>
-        <a:effectLst/>
-      </dsp:spPr>
-      <dsp:style>
-        <a:lnRef idx="2">
-          <a:scrgbClr r="0" g="0" b="0"/>
-        </a:lnRef>
-        <a:fillRef idx="1">
-          <a:scrgbClr r="0" g="0" b="0"/>
-        </a:fillRef>
-        <a:effectRef idx="0">
-          <a:scrgbClr r="0" g="0" b="0"/>
-        </a:effectRef>
-        <a:fontRef idx="minor">
-          <a:schemeClr val="lt1"/>
-        </a:fontRef>
-      </dsp:style>
-      <dsp:txBody>
-        <a:bodyPr spcFirstLastPara="0" vert="horz" wrap="square" lIns="88900" tIns="0" rIns="88900" bIns="0" numCol="1" spcCol="1270" anchor="t" anchorCtr="0">
-          <a:noAutofit/>
-        </a:bodyPr>
-        <a:lstStyle/>
-        <a:p>
-          <a:pPr lvl="0" algn="l" defTabSz="622300">
-            <a:lnSpc>
-              <a:spcPct val="90000"/>
-            </a:lnSpc>
-            <a:spcBef>
-              <a:spcPct val="0"/>
-            </a:spcBef>
-            <a:spcAft>
-              <a:spcPct val="35000"/>
-            </a:spcAft>
-          </a:pPr>
-          <a:r>
-            <a:rPr lang="fr-FR" sz="1400" kern="1200" smtClean="0">
-              <a:solidFill>
-                <a:schemeClr val="accent3">
-                  <a:lumMod val="75000"/>
-                </a:schemeClr>
-              </a:solidFill>
-            </a:rPr>
-            <a:t>OUTCOMES</a:t>
-          </a:r>
-          <a:endParaRPr lang="fr-FR" sz="1400" kern="1200">
-            <a:solidFill>
-              <a:schemeClr val="accent3">
-                <a:lumMod val="75000"/>
-              </a:schemeClr>
-            </a:solidFill>
-          </a:endParaRPr>
-        </a:p>
-        <a:p>
-          <a:pPr marL="57150" lvl="1" indent="-57150" algn="l" defTabSz="466725">
-            <a:lnSpc>
-              <a:spcPct val="90000"/>
-            </a:lnSpc>
-            <a:spcBef>
-              <a:spcPct val="0"/>
-            </a:spcBef>
-            <a:spcAft>
-              <a:spcPct val="15000"/>
-            </a:spcAft>
-            <a:buChar char="••"/>
-          </a:pPr>
-          <a:r>
-            <a:rPr lang="fr-FR" sz="1050" kern="1200" smtClean="0">
-              <a:solidFill>
-                <a:schemeClr val="accent3">
-                  <a:lumMod val="75000"/>
-                </a:schemeClr>
-              </a:solidFill>
-            </a:rPr>
-            <a:t>IAR</a:t>
-          </a:r>
-          <a:endParaRPr lang="fr-FR" sz="1050" kern="1200">
-            <a:solidFill>
-              <a:schemeClr val="accent3">
-                <a:lumMod val="75000"/>
-              </a:schemeClr>
-            </a:solidFill>
-          </a:endParaRPr>
-        </a:p>
-        <a:p>
-          <a:pPr marL="57150" lvl="1" indent="-57150" algn="l" defTabSz="466725">
-            <a:lnSpc>
-              <a:spcPct val="90000"/>
-            </a:lnSpc>
-            <a:spcBef>
-              <a:spcPct val="0"/>
-            </a:spcBef>
-            <a:spcAft>
-              <a:spcPct val="15000"/>
-            </a:spcAft>
-            <a:buChar char="••"/>
-          </a:pPr>
-          <a:r>
-            <a:rPr lang="fr-FR" sz="1050" kern="1200" smtClean="0">
-              <a:solidFill>
-                <a:schemeClr val="accent3">
-                  <a:lumMod val="75000"/>
-                </a:schemeClr>
-              </a:solidFill>
-            </a:rPr>
-            <a:t>Interaction with other conributors</a:t>
-          </a:r>
-          <a:endParaRPr lang="fr-FR" sz="1050" kern="1200">
-            <a:solidFill>
-              <a:schemeClr val="accent3">
-                <a:lumMod val="75000"/>
-              </a:schemeClr>
-            </a:solidFill>
-          </a:endParaRPr>
-        </a:p>
-      </dsp:txBody>
-      <dsp:txXfrm rot="5400000">
-        <a:off x="4507710" y="541526"/>
-        <a:ext cx="2095616" cy="1624583"/>
-      </dsp:txXfrm>
-    </dsp:sp>
-    <dsp:sp modelId="{F1E2BDB2-0BA9-4FD2-86F9-2CAEA5A63A20}">
-      <dsp:nvSpPr>
-        <dsp:cNvPr id="0" name=""/>
-        <dsp:cNvSpPr/>
-      </dsp:nvSpPr>
-      <dsp:spPr>
-        <a:xfrm rot="16200000">
-          <a:off x="6454487" y="306010"/>
-          <a:ext cx="2707637" cy="2095616"/>
-        </a:xfrm>
-        <a:prstGeom prst="flowChartManualOperation">
-          <a:avLst/>
-        </a:prstGeom>
-        <a:solidFill>
-          <a:schemeClr val="lt1">
-            <a:hueOff val="0"/>
-            <a:satOff val="0"/>
-            <a:lumOff val="0"/>
-            <a:alphaOff val="0"/>
-          </a:schemeClr>
-        </a:solidFill>
-        <a:ln w="15875" cap="flat" cmpd="sng" algn="ctr">
-          <a:solidFill>
-            <a:schemeClr val="accent3">
-              <a:shade val="80000"/>
-              <a:hueOff val="0"/>
-              <a:satOff val="0"/>
-              <a:lumOff val="0"/>
-              <a:alphaOff val="0"/>
-            </a:schemeClr>
-          </a:solidFill>
-          <a:prstDash val="solid"/>
-        </a:ln>
-        <a:effectLst/>
-      </dsp:spPr>
-      <dsp:style>
-        <a:lnRef idx="2">
-          <a:scrgbClr r="0" g="0" b="0"/>
-        </a:lnRef>
-        <a:fillRef idx="1">
-          <a:scrgbClr r="0" g="0" b="0"/>
-        </a:fillRef>
-        <a:effectRef idx="0">
-          <a:scrgbClr r="0" g="0" b="0"/>
-        </a:effectRef>
-        <a:fontRef idx="minor">
-          <a:schemeClr val="lt1"/>
-        </a:fontRef>
-      </dsp:style>
-      <dsp:txBody>
-        <a:bodyPr spcFirstLastPara="0" vert="horz" wrap="square" lIns="88900" tIns="0" rIns="88900" bIns="0" numCol="1" spcCol="1270" anchor="t" anchorCtr="0">
-          <a:noAutofit/>
-        </a:bodyPr>
-        <a:lstStyle/>
-        <a:p>
-          <a:pPr lvl="0" algn="l" defTabSz="622300">
-            <a:lnSpc>
-              <a:spcPct val="90000"/>
-            </a:lnSpc>
-            <a:spcBef>
-              <a:spcPct val="0"/>
-            </a:spcBef>
-            <a:spcAft>
-              <a:spcPct val="35000"/>
-            </a:spcAft>
-          </a:pPr>
-          <a:r>
-            <a:rPr lang="fr-FR" sz="1400" kern="1200" smtClean="0">
-              <a:solidFill>
-                <a:schemeClr val="accent3">
-                  <a:lumMod val="75000"/>
-                </a:schemeClr>
-              </a:solidFill>
-            </a:rPr>
-            <a:t>OUTPUTS</a:t>
-          </a:r>
-          <a:endParaRPr lang="fr-FR" sz="1400" kern="1200">
-            <a:solidFill>
-              <a:schemeClr val="accent3">
-                <a:lumMod val="75000"/>
-              </a:schemeClr>
-            </a:solidFill>
-          </a:endParaRPr>
-        </a:p>
-        <a:p>
-          <a:pPr marL="57150" lvl="1" indent="-57150" algn="l" defTabSz="466725">
-            <a:lnSpc>
-              <a:spcPct val="90000"/>
-            </a:lnSpc>
-            <a:spcBef>
-              <a:spcPct val="0"/>
-            </a:spcBef>
-            <a:spcAft>
-              <a:spcPct val="15000"/>
-            </a:spcAft>
-            <a:buChar char="••"/>
-          </a:pPr>
-          <a:r>
-            <a:rPr lang="fr-FR" sz="1050" kern="1200" smtClean="0">
-              <a:solidFill>
-                <a:schemeClr val="accent3">
-                  <a:lumMod val="75000"/>
-                </a:schemeClr>
-              </a:solidFill>
-            </a:rPr>
-            <a:t>Know about the fuel cell industry</a:t>
-          </a:r>
-          <a:endParaRPr lang="fr-FR" sz="1050" kern="1200">
-            <a:solidFill>
-              <a:schemeClr val="accent3">
-                <a:lumMod val="75000"/>
-              </a:schemeClr>
-            </a:solidFill>
-          </a:endParaRPr>
-        </a:p>
-        <a:p>
-          <a:pPr marL="114300" lvl="2" indent="-57150" algn="l" defTabSz="466725">
-            <a:lnSpc>
-              <a:spcPct val="90000"/>
-            </a:lnSpc>
-            <a:spcBef>
-              <a:spcPct val="0"/>
-            </a:spcBef>
-            <a:spcAft>
-              <a:spcPct val="15000"/>
-            </a:spcAft>
-            <a:buChar char="••"/>
-          </a:pPr>
-          <a:r>
-            <a:rPr lang="fr-FR" sz="1050" kern="1200" smtClean="0">
-              <a:solidFill>
-                <a:schemeClr val="accent3">
-                  <a:lumMod val="75000"/>
-                </a:schemeClr>
-              </a:solidFill>
-            </a:rPr>
-            <a:t>Know the state and needs of the market</a:t>
-          </a:r>
-          <a:endParaRPr lang="fr-FR" sz="1050" kern="1200">
-            <a:solidFill>
-              <a:schemeClr val="accent3">
-                <a:lumMod val="75000"/>
-              </a:schemeClr>
-            </a:solidFill>
-          </a:endParaRPr>
-        </a:p>
-        <a:p>
-          <a:pPr marL="57150" lvl="1" indent="-57150" algn="l" defTabSz="466725">
-            <a:lnSpc>
-              <a:spcPct val="90000"/>
-            </a:lnSpc>
-            <a:spcBef>
-              <a:spcPct val="0"/>
-            </a:spcBef>
-            <a:spcAft>
-              <a:spcPct val="15000"/>
-            </a:spcAft>
-            <a:buChar char="••"/>
-          </a:pPr>
-          <a:r>
-            <a:rPr lang="fr-FR" sz="1050" kern="1200" smtClean="0">
-              <a:solidFill>
-                <a:schemeClr val="accent3">
-                  <a:lumMod val="75000"/>
-                </a:schemeClr>
-              </a:solidFill>
-            </a:rPr>
-            <a:t>IAR available to everyone</a:t>
-          </a:r>
-          <a:endParaRPr lang="fr-FR" sz="1050" kern="1200">
-            <a:solidFill>
-              <a:schemeClr val="accent3">
-                <a:lumMod val="75000"/>
-              </a:schemeClr>
-            </a:solidFill>
-          </a:endParaRPr>
-        </a:p>
-        <a:p>
-          <a:pPr marL="57150" lvl="1" indent="-57150" algn="l" defTabSz="466725">
-            <a:lnSpc>
-              <a:spcPct val="90000"/>
-            </a:lnSpc>
-            <a:spcBef>
-              <a:spcPct val="0"/>
-            </a:spcBef>
-            <a:spcAft>
-              <a:spcPct val="15000"/>
-            </a:spcAft>
-            <a:buChar char="••"/>
-          </a:pPr>
-          <a:r>
-            <a:rPr lang="fr-FR" sz="1050" kern="1200" smtClean="0">
-              <a:solidFill>
-                <a:schemeClr val="accent3">
-                  <a:lumMod val="75000"/>
-                </a:schemeClr>
-              </a:solidFill>
-            </a:rPr>
-            <a:t>IAR understandable by everyone</a:t>
-          </a:r>
-          <a:endParaRPr lang="fr-FR" sz="1050" kern="1200">
-            <a:solidFill>
-              <a:schemeClr val="accent3">
-                <a:lumMod val="75000"/>
-              </a:schemeClr>
-            </a:solidFill>
-          </a:endParaRPr>
-        </a:p>
-        <a:p>
-          <a:pPr marL="57150" lvl="1" indent="-57150" algn="l" defTabSz="466725">
-            <a:lnSpc>
-              <a:spcPct val="90000"/>
-            </a:lnSpc>
-            <a:spcBef>
-              <a:spcPct val="0"/>
-            </a:spcBef>
-            <a:spcAft>
-              <a:spcPct val="15000"/>
-            </a:spcAft>
-            <a:buChar char="••"/>
-          </a:pPr>
-          <a:endParaRPr lang="fr-FR" sz="1050" kern="1200">
-            <a:solidFill>
-              <a:schemeClr val="accent3">
-                <a:lumMod val="75000"/>
-              </a:schemeClr>
-            </a:solidFill>
-          </a:endParaRPr>
-        </a:p>
-      </dsp:txBody>
-      <dsp:txXfrm rot="5400000">
-        <a:off x="6760498" y="541526"/>
-        <a:ext cx="2095616" cy="1624583"/>
-      </dsp:txXfrm>
-    </dsp:sp>
   </dsp:spTree>
 </dsp:drawing>
 </file>
@@ -6191,7 +4039,7 @@
           <a:p>
             <a:fld id="{3C34E867-41F4-48E7-8B36-52D0CC1AAFEA}" type="slidenum">
               <a:rPr lang="en-US" smtClean="0"/>
-              <a:t>‹#›</a:t>
+              <a:t>‹N°›</a:t>
             </a:fld>
             <a:endParaRPr lang="en-US"/>
           </a:p>
@@ -6656,7 +4504,7 @@
           <a:p>
             <a:fld id="{D376626B-8044-4126-A03C-8C0AE257EC41}" type="slidenum">
               <a:rPr lang="fr-FR" smtClean="0"/>
-              <a:t>‹#›</a:t>
+              <a:t>‹N°›</a:t>
             </a:fld>
             <a:endParaRPr lang="fr-FR"/>
           </a:p>
@@ -6868,7 +4716,7 @@
           <a:p>
             <a:fld id="{D376626B-8044-4126-A03C-8C0AE257EC41}" type="slidenum">
               <a:rPr lang="fr-FR" smtClean="0"/>
-              <a:t>‹#›</a:t>
+              <a:t>‹N°›</a:t>
             </a:fld>
             <a:endParaRPr lang="fr-FR"/>
           </a:p>
@@ -7128,7 +4976,7 @@
           <a:p>
             <a:fld id="{D376626B-8044-4126-A03C-8C0AE257EC41}" type="slidenum">
               <a:rPr lang="fr-FR" smtClean="0"/>
-              <a:t>‹#›</a:t>
+              <a:t>‹N°›</a:t>
             </a:fld>
             <a:endParaRPr lang="fr-FR"/>
           </a:p>
@@ -7302,7 +5150,7 @@
           <a:p>
             <a:fld id="{D376626B-8044-4126-A03C-8C0AE257EC41}" type="slidenum">
               <a:rPr lang="fr-FR" smtClean="0"/>
-              <a:t>‹#›</a:t>
+              <a:t>‹N°›</a:t>
             </a:fld>
             <a:endParaRPr lang="fr-FR"/>
           </a:p>
@@ -7649,7 +5497,7 @@
           <a:p>
             <a:fld id="{D376626B-8044-4126-A03C-8C0AE257EC41}" type="slidenum">
               <a:rPr lang="fr-FR" smtClean="0"/>
-              <a:t>‹#›</a:t>
+              <a:t>‹N°›</a:t>
             </a:fld>
             <a:endParaRPr lang="fr-FR"/>
           </a:p>
@@ -7928,7 +5776,7 @@
           <a:p>
             <a:fld id="{D376626B-8044-4126-A03C-8C0AE257EC41}" type="slidenum">
               <a:rPr lang="fr-FR" smtClean="0"/>
-              <a:t>‹#›</a:t>
+              <a:t>‹N°›</a:t>
             </a:fld>
             <a:endParaRPr lang="fr-FR"/>
           </a:p>
@@ -8311,7 +6159,7 @@
           <a:p>
             <a:fld id="{D376626B-8044-4126-A03C-8C0AE257EC41}" type="slidenum">
               <a:rPr lang="fr-FR" smtClean="0"/>
-              <a:t>‹#›</a:t>
+              <a:t>‹N°›</a:t>
             </a:fld>
             <a:endParaRPr lang="fr-FR"/>
           </a:p>
@@ -8433,7 +6281,7 @@
           <a:p>
             <a:fld id="{D376626B-8044-4126-A03C-8C0AE257EC41}" type="slidenum">
               <a:rPr lang="fr-FR" smtClean="0"/>
-              <a:t>‹#›</a:t>
+              <a:t>‹N°›</a:t>
             </a:fld>
             <a:endParaRPr lang="fr-FR"/>
           </a:p>
@@ -8616,7 +6464,7 @@
           <a:p>
             <a:fld id="{D376626B-8044-4126-A03C-8C0AE257EC41}" type="slidenum">
               <a:rPr lang="fr-FR" smtClean="0"/>
-              <a:t>‹#›</a:t>
+              <a:t>‹N°›</a:t>
             </a:fld>
             <a:endParaRPr lang="fr-FR"/>
           </a:p>
@@ -8987,7 +6835,7 @@
           <a:p>
             <a:fld id="{D376626B-8044-4126-A03C-8C0AE257EC41}" type="slidenum">
               <a:rPr lang="fr-FR" smtClean="0"/>
-              <a:t>‹#›</a:t>
+              <a:t>‹N°›</a:t>
             </a:fld>
             <a:endParaRPr lang="fr-FR"/>
           </a:p>
@@ -9347,7 +7195,7 @@
           <a:p>
             <a:fld id="{D376626B-8044-4126-A03C-8C0AE257EC41}" type="slidenum">
               <a:rPr lang="fr-FR" smtClean="0"/>
-              <a:t>‹#›</a:t>
+              <a:t>‹N°›</a:t>
             </a:fld>
             <a:endParaRPr lang="fr-FR"/>
           </a:p>
@@ -9670,7 +7518,7 @@
           <a:p>
             <a:fld id="{D376626B-8044-4126-A03C-8C0AE257EC41}" type="slidenum">
               <a:rPr lang="fr-FR" smtClean="0"/>
-              <a:t>‹#›</a:t>
+              <a:t>‹N°›</a:t>
             </a:fld>
             <a:endParaRPr lang="fr-FR"/>
           </a:p>
@@ -10320,159 +8168,6 @@
     <p:extLst>
       <p:ext uri="{BB962C8B-B14F-4D97-AF65-F5344CB8AC3E}">
         <p14:creationId xmlns:p14="http://schemas.microsoft.com/office/powerpoint/2010/main" val="2491292434"/>
-      </p:ext>
-    </p:extLst>
-  </p:cSld>
-  <p:clrMapOvr>
-    <a:masterClrMapping/>
-  </p:clrMapOvr>
-  <p:timing>
-    <p:tnLst>
-      <p:par>
-        <p:cTn id="1" dur="indefinite" restart="never" nodeType="tmRoot"/>
-      </p:par>
-    </p:tnLst>
-  </p:timing>
-</p:sld>
-</file>
-
-<file path=ppt/slides/slide10.xml><?xml version="1.0" encoding="utf-8"?>
-<p:sld xmlns:a="http://schemas.openxmlformats.org/drawingml/2006/main" xmlns:r="http://schemas.openxmlformats.org/officeDocument/2006/relationships" xmlns:p="http://schemas.openxmlformats.org/presentationml/2006/main">
-  <p:cSld>
-    <p:spTree>
-      <p:nvGrpSpPr>
-        <p:cNvPr id="1" name=""/>
-        <p:cNvGrpSpPr/>
-        <p:nvPr/>
-      </p:nvGrpSpPr>
-      <p:grpSpPr>
-        <a:xfrm>
-          <a:off x="0" y="0"/>
-          <a:ext cx="0" cy="0"/>
-          <a:chOff x="0" y="0"/>
-          <a:chExt cx="0" cy="0"/>
-        </a:xfrm>
-      </p:grpSpPr>
-      <p:sp>
-        <p:nvSpPr>
-          <p:cNvPr id="2" name="Title 1"/>
-          <p:cNvSpPr>
-            <a:spLocks noGrp="1"/>
-          </p:cNvSpPr>
-          <p:nvPr>
-            <p:ph type="title"/>
-          </p:nvPr>
-        </p:nvSpPr>
-        <p:spPr/>
-        <p:txBody>
-          <a:bodyPr/>
-          <a:lstStyle/>
-          <a:p>
-            <a:r>
-              <a:rPr lang="en-US" dirty="0"/>
-              <a:t>IAR Progress</a:t>
-            </a:r>
-          </a:p>
-        </p:txBody>
-      </p:sp>
-      <p:graphicFrame>
-        <p:nvGraphicFramePr>
-          <p:cNvPr id="18" name="Chart 17"/>
-          <p:cNvGraphicFramePr/>
-          <p:nvPr>
-            <p:extLst>
-              <p:ext uri="{D42A27DB-BD31-4B8C-83A1-F6EECF244321}">
-                <p14:modId xmlns:p14="http://schemas.microsoft.com/office/powerpoint/2010/main" val="2984458898"/>
-              </p:ext>
-            </p:extLst>
-          </p:nvPr>
-        </p:nvGraphicFramePr>
-        <p:xfrm>
-          <a:off x="1370818" y="1228317"/>
-          <a:ext cx="8128000" cy="5418667"/>
-        </p:xfrm>
-        <a:graphic>
-          <a:graphicData uri="http://schemas.openxmlformats.org/drawingml/2006/chart">
-            <c:chart xmlns:c="http://schemas.openxmlformats.org/drawingml/2006/chart" xmlns:r="http://schemas.openxmlformats.org/officeDocument/2006/relationships" r:id="rId2"/>
-          </a:graphicData>
-        </a:graphic>
-      </p:graphicFrame>
-      <p:sp>
-        <p:nvSpPr>
-          <p:cNvPr id="19" name="TextBox 18"/>
-          <p:cNvSpPr txBox="1"/>
-          <p:nvPr/>
-        </p:nvSpPr>
-        <p:spPr>
-          <a:xfrm>
-            <a:off x="5193547" y="4529797"/>
-            <a:ext cx="461665" cy="92398"/>
-          </a:xfrm>
-          <a:prstGeom prst="rect">
-            <a:avLst/>
-          </a:prstGeom>
-          <a:noFill/>
-        </p:spPr>
-        <p:txBody>
-          <a:bodyPr vert="eaVert" wrap="none" rtlCol="0">
-            <a:spAutoFit/>
-          </a:bodyPr>
-          <a:lstStyle/>
-          <a:p>
-            <a:endParaRPr lang="en-US" dirty="0"/>
-          </a:p>
-        </p:txBody>
-      </p:sp>
-      <p:sp>
-        <p:nvSpPr>
-          <p:cNvPr id="3" name="Espace réservé du pied de page 2"/>
-          <p:cNvSpPr>
-            <a:spLocks noGrp="1"/>
-          </p:cNvSpPr>
-          <p:nvPr>
-            <p:ph type="ftr" sz="quarter" idx="11"/>
-          </p:nvPr>
-        </p:nvSpPr>
-        <p:spPr/>
-        <p:txBody>
-          <a:bodyPr/>
-          <a:lstStyle/>
-          <a:p>
-            <a:r>
-              <a:rPr lang="fr-FR" smtClean="0"/>
-              <a:t>Banmbu - 20/05/2015</a:t>
-            </a:r>
-            <a:endParaRPr lang="fr-FR"/>
-          </a:p>
-        </p:txBody>
-      </p:sp>
-      <p:sp>
-        <p:nvSpPr>
-          <p:cNvPr id="4" name="Espace réservé du numéro de diapositive 3"/>
-          <p:cNvSpPr>
-            <a:spLocks noGrp="1"/>
-          </p:cNvSpPr>
-          <p:nvPr>
-            <p:ph type="sldNum" sz="quarter" idx="12"/>
-          </p:nvPr>
-        </p:nvSpPr>
-        <p:spPr/>
-        <p:txBody>
-          <a:bodyPr/>
-          <a:lstStyle/>
-          <a:p>
-            <a:fld id="{D376626B-8044-4126-A03C-8C0AE257EC41}" type="slidenum">
-              <a:rPr lang="fr-FR" smtClean="0"/>
-              <a:t>10</a:t>
-            </a:fld>
-            <a:endParaRPr lang="fr-FR"/>
-          </a:p>
-        </p:txBody>
-      </p:sp>
-    </p:spTree>
-    <p:extLst>
-      <p:ext uri="{BB962C8B-B14F-4D97-AF65-F5344CB8AC3E}">
-        <p14:creationId xmlns:p14="http://schemas.microsoft.com/office/powerpoint/2010/main" val="4044968407"/>
       </p:ext>
     </p:extLst>
   </p:cSld>

</xml_diff>

<commit_message>
Updated Part 2, Image references, and Citavi references
</commit_message>
<xml_diff>
--- a/Assignments/Presentations/2015.05.20Presentation_2.pptx
+++ b/Assignments/Presentations/2015.05.20Presentation_2.pptx
@@ -2588,6 +2588,966 @@
       <dsp:cNvGrpSpPr/>
     </dsp:nvGrpSpPr>
     <dsp:grpSpPr/>
+    <dsp:sp modelId="{3DD4DCC5-CD2A-4C80-9516-43D7C916D6B5}">
+      <dsp:nvSpPr>
+        <dsp:cNvPr id="0" name=""/>
+        <dsp:cNvSpPr/>
+      </dsp:nvSpPr>
+      <dsp:spPr>
+        <a:xfrm rot="16200000">
+          <a:off x="-306010" y="306010"/>
+          <a:ext cx="2707637" cy="2095616"/>
+        </a:xfrm>
+        <a:prstGeom prst="flowChartManualOperation">
+          <a:avLst/>
+        </a:prstGeom>
+        <a:solidFill>
+          <a:schemeClr val="lt1">
+            <a:hueOff val="0"/>
+            <a:satOff val="0"/>
+            <a:lumOff val="0"/>
+            <a:alphaOff val="0"/>
+          </a:schemeClr>
+        </a:solidFill>
+        <a:ln w="15875" cap="flat" cmpd="sng" algn="ctr">
+          <a:solidFill>
+            <a:schemeClr val="accent3">
+              <a:shade val="80000"/>
+              <a:hueOff val="0"/>
+              <a:satOff val="0"/>
+              <a:lumOff val="0"/>
+              <a:alphaOff val="0"/>
+            </a:schemeClr>
+          </a:solidFill>
+          <a:prstDash val="solid"/>
+        </a:ln>
+        <a:effectLst/>
+      </dsp:spPr>
+      <dsp:style>
+        <a:lnRef idx="2">
+          <a:scrgbClr r="0" g="0" b="0"/>
+        </a:lnRef>
+        <a:fillRef idx="1">
+          <a:scrgbClr r="0" g="0" b="0"/>
+        </a:fillRef>
+        <a:effectRef idx="0">
+          <a:scrgbClr r="0" g="0" b="0"/>
+        </a:effectRef>
+        <a:fontRef idx="minor">
+          <a:schemeClr val="lt1"/>
+        </a:fontRef>
+      </dsp:style>
+      <dsp:txBody>
+        <a:bodyPr spcFirstLastPara="0" vert="horz" wrap="square" lIns="88900" tIns="0" rIns="88900" bIns="0" numCol="1" spcCol="1270" anchor="t" anchorCtr="0">
+          <a:noAutofit/>
+        </a:bodyPr>
+        <a:lstStyle/>
+        <a:p>
+          <a:pPr lvl="0" algn="l" defTabSz="622300">
+            <a:lnSpc>
+              <a:spcPct val="90000"/>
+            </a:lnSpc>
+            <a:spcBef>
+              <a:spcPct val="0"/>
+            </a:spcBef>
+            <a:spcAft>
+              <a:spcPct val="35000"/>
+            </a:spcAft>
+          </a:pPr>
+          <a:r>
+            <a:rPr lang="fr-FR" sz="1400" kern="1200" smtClean="0">
+              <a:solidFill>
+                <a:schemeClr val="accent3">
+                  <a:lumMod val="75000"/>
+                </a:schemeClr>
+              </a:solidFill>
+            </a:rPr>
+            <a:t>RESOURCES</a:t>
+          </a:r>
+          <a:endParaRPr lang="fr-FR" sz="1400" kern="1200" dirty="0">
+            <a:solidFill>
+              <a:schemeClr val="accent3">
+                <a:lumMod val="75000"/>
+              </a:schemeClr>
+            </a:solidFill>
+          </a:endParaRPr>
+        </a:p>
+        <a:p>
+          <a:pPr marL="57150" lvl="1" indent="-57150" algn="l" defTabSz="466725">
+            <a:lnSpc>
+              <a:spcPct val="90000"/>
+            </a:lnSpc>
+            <a:spcBef>
+              <a:spcPct val="0"/>
+            </a:spcBef>
+            <a:spcAft>
+              <a:spcPct val="15000"/>
+            </a:spcAft>
+            <a:buChar char="••"/>
+          </a:pPr>
+          <a:r>
+            <a:rPr lang="fr-FR" sz="1050" kern="1200" smtClean="0">
+              <a:solidFill>
+                <a:schemeClr val="accent3">
+                  <a:lumMod val="75000"/>
+                </a:schemeClr>
+              </a:solidFill>
+            </a:rPr>
+            <a:t>1 Supervisor</a:t>
+          </a:r>
+          <a:endParaRPr lang="fr-FR" sz="1050" kern="1200">
+            <a:solidFill>
+              <a:schemeClr val="accent3">
+                <a:lumMod val="75000"/>
+              </a:schemeClr>
+            </a:solidFill>
+          </a:endParaRPr>
+        </a:p>
+        <a:p>
+          <a:pPr marL="57150" lvl="1" indent="-57150" algn="l" defTabSz="466725">
+            <a:lnSpc>
+              <a:spcPct val="90000"/>
+            </a:lnSpc>
+            <a:spcBef>
+              <a:spcPct val="0"/>
+            </a:spcBef>
+            <a:spcAft>
+              <a:spcPct val="15000"/>
+            </a:spcAft>
+            <a:buChar char="••"/>
+          </a:pPr>
+          <a:r>
+            <a:rPr lang="fr-FR" sz="1050" kern="1200" smtClean="0">
+              <a:solidFill>
+                <a:schemeClr val="accent3">
+                  <a:lumMod val="75000"/>
+                </a:schemeClr>
+              </a:solidFill>
+            </a:rPr>
+            <a:t>20 Contributors</a:t>
+          </a:r>
+          <a:endParaRPr lang="fr-FR" sz="1050" kern="1200" dirty="0">
+            <a:solidFill>
+              <a:schemeClr val="accent3">
+                <a:lumMod val="75000"/>
+              </a:schemeClr>
+            </a:solidFill>
+          </a:endParaRPr>
+        </a:p>
+        <a:p>
+          <a:pPr marL="57150" lvl="1" indent="-57150" algn="l" defTabSz="466725">
+            <a:lnSpc>
+              <a:spcPct val="90000"/>
+            </a:lnSpc>
+            <a:spcBef>
+              <a:spcPct val="0"/>
+            </a:spcBef>
+            <a:spcAft>
+              <a:spcPct val="15000"/>
+            </a:spcAft>
+            <a:buChar char="••"/>
+          </a:pPr>
+          <a:r>
+            <a:rPr lang="fr-FR" sz="1050" kern="1200" smtClean="0">
+              <a:solidFill>
+                <a:schemeClr val="accent3">
+                  <a:lumMod val="75000"/>
+                </a:schemeClr>
+              </a:solidFill>
+            </a:rPr>
+            <a:t>4 Authors</a:t>
+          </a:r>
+          <a:endParaRPr lang="fr-FR" sz="1050" kern="1200" dirty="0">
+            <a:solidFill>
+              <a:schemeClr val="accent3">
+                <a:lumMod val="75000"/>
+              </a:schemeClr>
+            </a:solidFill>
+          </a:endParaRPr>
+        </a:p>
+        <a:p>
+          <a:pPr marL="57150" lvl="1" indent="-57150" algn="l" defTabSz="466725">
+            <a:lnSpc>
+              <a:spcPct val="90000"/>
+            </a:lnSpc>
+            <a:spcBef>
+              <a:spcPct val="0"/>
+            </a:spcBef>
+            <a:spcAft>
+              <a:spcPct val="15000"/>
+            </a:spcAft>
+            <a:buChar char="••"/>
+          </a:pPr>
+          <a:r>
+            <a:rPr lang="fr-FR" sz="1050" kern="1200" smtClean="0">
+              <a:solidFill>
+                <a:schemeClr val="accent3">
+                  <a:lumMod val="75000"/>
+                </a:schemeClr>
+              </a:solidFill>
+            </a:rPr>
+            <a:t>Documetation anout IAR</a:t>
+          </a:r>
+          <a:endParaRPr lang="fr-FR" sz="1050" kern="1200">
+            <a:solidFill>
+              <a:schemeClr val="accent3">
+                <a:lumMod val="75000"/>
+              </a:schemeClr>
+            </a:solidFill>
+          </a:endParaRPr>
+        </a:p>
+        <a:p>
+          <a:pPr marL="57150" lvl="1" indent="-57150" algn="l" defTabSz="466725">
+            <a:lnSpc>
+              <a:spcPct val="90000"/>
+            </a:lnSpc>
+            <a:spcBef>
+              <a:spcPct val="0"/>
+            </a:spcBef>
+            <a:spcAft>
+              <a:spcPct val="15000"/>
+            </a:spcAft>
+            <a:buChar char="••"/>
+          </a:pPr>
+          <a:r>
+            <a:rPr lang="fr-FR" sz="1050" kern="1200" smtClean="0">
+              <a:solidFill>
+                <a:schemeClr val="accent3">
+                  <a:lumMod val="75000"/>
+                </a:schemeClr>
+              </a:solidFill>
+            </a:rPr>
+            <a:t>Documentation about Fuel Cells</a:t>
+          </a:r>
+          <a:endParaRPr lang="fr-FR" sz="1050" kern="1200">
+            <a:solidFill>
+              <a:schemeClr val="accent3">
+                <a:lumMod val="75000"/>
+              </a:schemeClr>
+            </a:solidFill>
+          </a:endParaRPr>
+        </a:p>
+        <a:p>
+          <a:pPr marL="57150" lvl="1" indent="-57150" algn="l" defTabSz="466725">
+            <a:lnSpc>
+              <a:spcPct val="90000"/>
+            </a:lnSpc>
+            <a:spcBef>
+              <a:spcPct val="0"/>
+            </a:spcBef>
+            <a:spcAft>
+              <a:spcPct val="15000"/>
+            </a:spcAft>
+            <a:buChar char="••"/>
+          </a:pPr>
+          <a:r>
+            <a:rPr lang="fr-FR" sz="1050" kern="1200" smtClean="0">
+              <a:solidFill>
+                <a:schemeClr val="accent3">
+                  <a:lumMod val="75000"/>
+                </a:schemeClr>
+              </a:solidFill>
+            </a:rPr>
+            <a:t>Online data sharing platform</a:t>
+          </a:r>
+          <a:endParaRPr lang="fr-FR" sz="1050" kern="1200">
+            <a:solidFill>
+              <a:schemeClr val="accent3">
+                <a:lumMod val="75000"/>
+              </a:schemeClr>
+            </a:solidFill>
+          </a:endParaRPr>
+        </a:p>
+        <a:p>
+          <a:pPr marL="57150" lvl="1" indent="-57150" algn="l" defTabSz="466725">
+            <a:lnSpc>
+              <a:spcPct val="90000"/>
+            </a:lnSpc>
+            <a:spcBef>
+              <a:spcPct val="0"/>
+            </a:spcBef>
+            <a:spcAft>
+              <a:spcPct val="15000"/>
+            </a:spcAft>
+            <a:buChar char="••"/>
+          </a:pPr>
+          <a:endParaRPr lang="fr-FR" sz="1050" kern="1200">
+            <a:solidFill>
+              <a:schemeClr val="accent3">
+                <a:lumMod val="75000"/>
+              </a:schemeClr>
+            </a:solidFill>
+          </a:endParaRPr>
+        </a:p>
+      </dsp:txBody>
+      <dsp:txXfrm rot="5400000">
+        <a:off x="1" y="541526"/>
+        <a:ext cx="2095616" cy="1624583"/>
+      </dsp:txXfrm>
+    </dsp:sp>
+    <dsp:sp modelId="{06BACB2E-25D6-491F-9902-6DE6A89C06CD}">
+      <dsp:nvSpPr>
+        <dsp:cNvPr id="0" name=""/>
+        <dsp:cNvSpPr/>
+      </dsp:nvSpPr>
+      <dsp:spPr>
+        <a:xfrm rot="16200000">
+          <a:off x="1948912" y="306010"/>
+          <a:ext cx="2707637" cy="2095616"/>
+        </a:xfrm>
+        <a:prstGeom prst="flowChartManualOperation">
+          <a:avLst/>
+        </a:prstGeom>
+        <a:solidFill>
+          <a:schemeClr val="lt1">
+            <a:hueOff val="0"/>
+            <a:satOff val="0"/>
+            <a:lumOff val="0"/>
+            <a:alphaOff val="0"/>
+          </a:schemeClr>
+        </a:solidFill>
+        <a:ln w="15875" cap="flat" cmpd="sng" algn="ctr">
+          <a:solidFill>
+            <a:schemeClr val="accent3">
+              <a:shade val="80000"/>
+              <a:hueOff val="0"/>
+              <a:satOff val="0"/>
+              <a:lumOff val="0"/>
+              <a:alphaOff val="0"/>
+            </a:schemeClr>
+          </a:solidFill>
+          <a:prstDash val="solid"/>
+        </a:ln>
+        <a:effectLst/>
+      </dsp:spPr>
+      <dsp:style>
+        <a:lnRef idx="2">
+          <a:scrgbClr r="0" g="0" b="0"/>
+        </a:lnRef>
+        <a:fillRef idx="1">
+          <a:scrgbClr r="0" g="0" b="0"/>
+        </a:fillRef>
+        <a:effectRef idx="0">
+          <a:scrgbClr r="0" g="0" b="0"/>
+        </a:effectRef>
+        <a:fontRef idx="minor">
+          <a:schemeClr val="lt1"/>
+        </a:fontRef>
+      </dsp:style>
+      <dsp:txBody>
+        <a:bodyPr spcFirstLastPara="0" vert="horz" wrap="square" lIns="88900" tIns="0" rIns="88900" bIns="0" numCol="1" spcCol="1270" anchor="t" anchorCtr="0">
+          <a:noAutofit/>
+        </a:bodyPr>
+        <a:lstStyle/>
+        <a:p>
+          <a:pPr lvl="0" algn="l" defTabSz="622300">
+            <a:lnSpc>
+              <a:spcPct val="90000"/>
+            </a:lnSpc>
+            <a:spcBef>
+              <a:spcPct val="0"/>
+            </a:spcBef>
+            <a:spcAft>
+              <a:spcPct val="35000"/>
+            </a:spcAft>
+          </a:pPr>
+          <a:r>
+            <a:rPr lang="fr-FR" sz="1400" kern="1200" smtClean="0">
+              <a:solidFill>
+                <a:schemeClr val="accent3">
+                  <a:lumMod val="75000"/>
+                </a:schemeClr>
+              </a:solidFill>
+            </a:rPr>
+            <a:t>ACTIVITIES</a:t>
+          </a:r>
+          <a:endParaRPr lang="fr-FR" sz="1400" kern="1200">
+            <a:solidFill>
+              <a:schemeClr val="accent3">
+                <a:lumMod val="75000"/>
+              </a:schemeClr>
+            </a:solidFill>
+          </a:endParaRPr>
+        </a:p>
+        <a:p>
+          <a:pPr marL="57150" lvl="1" indent="-57150" algn="l" defTabSz="466725">
+            <a:lnSpc>
+              <a:spcPct val="90000"/>
+            </a:lnSpc>
+            <a:spcBef>
+              <a:spcPct val="0"/>
+            </a:spcBef>
+            <a:spcAft>
+              <a:spcPct val="15000"/>
+            </a:spcAft>
+            <a:buChar char="••"/>
+          </a:pPr>
+          <a:r>
+            <a:rPr lang="fr-FR" sz="1050" kern="1200" smtClean="0">
+              <a:solidFill>
+                <a:schemeClr val="accent3">
+                  <a:lumMod val="75000"/>
+                </a:schemeClr>
+              </a:solidFill>
+            </a:rPr>
+            <a:t>Review Fuel Cell information</a:t>
+          </a:r>
+          <a:endParaRPr lang="fr-FR" sz="1050" kern="1200" dirty="0">
+            <a:solidFill>
+              <a:schemeClr val="accent3">
+                <a:lumMod val="75000"/>
+              </a:schemeClr>
+            </a:solidFill>
+          </a:endParaRPr>
+        </a:p>
+        <a:p>
+          <a:pPr marL="57150" lvl="1" indent="-57150" algn="l" defTabSz="466725">
+            <a:lnSpc>
+              <a:spcPct val="90000"/>
+            </a:lnSpc>
+            <a:spcBef>
+              <a:spcPct val="0"/>
+            </a:spcBef>
+            <a:spcAft>
+              <a:spcPct val="15000"/>
+            </a:spcAft>
+            <a:buChar char="••"/>
+          </a:pPr>
+          <a:r>
+            <a:rPr lang="fr-FR" sz="1050" kern="1200" smtClean="0">
+              <a:solidFill>
+                <a:schemeClr val="accent3">
+                  <a:lumMod val="75000"/>
+                </a:schemeClr>
+              </a:solidFill>
+            </a:rPr>
+            <a:t>Extract IAR structure from existing reports</a:t>
+          </a:r>
+          <a:endParaRPr lang="fr-FR" sz="1050" kern="1200" dirty="0">
+            <a:solidFill>
+              <a:schemeClr val="accent3">
+                <a:lumMod val="75000"/>
+              </a:schemeClr>
+            </a:solidFill>
+          </a:endParaRPr>
+        </a:p>
+        <a:p>
+          <a:pPr marL="57150" lvl="1" indent="-57150" algn="l" defTabSz="466725">
+            <a:lnSpc>
+              <a:spcPct val="90000"/>
+            </a:lnSpc>
+            <a:spcBef>
+              <a:spcPct val="0"/>
+            </a:spcBef>
+            <a:spcAft>
+              <a:spcPct val="15000"/>
+            </a:spcAft>
+            <a:buChar char="••"/>
+          </a:pPr>
+          <a:r>
+            <a:rPr lang="fr-FR" sz="1050" kern="1200" smtClean="0">
+              <a:solidFill>
+                <a:schemeClr val="accent3">
+                  <a:lumMod val="75000"/>
+                </a:schemeClr>
+              </a:solidFill>
+            </a:rPr>
+            <a:t>Build a personalized outline for the IAR</a:t>
+          </a:r>
+          <a:endParaRPr lang="fr-FR" sz="1050" kern="1200">
+            <a:solidFill>
+              <a:schemeClr val="accent3">
+                <a:lumMod val="75000"/>
+              </a:schemeClr>
+            </a:solidFill>
+          </a:endParaRPr>
+        </a:p>
+        <a:p>
+          <a:pPr marL="57150" lvl="1" indent="-57150" algn="l" defTabSz="466725">
+            <a:lnSpc>
+              <a:spcPct val="90000"/>
+            </a:lnSpc>
+            <a:spcBef>
+              <a:spcPct val="0"/>
+            </a:spcBef>
+            <a:spcAft>
+              <a:spcPct val="15000"/>
+            </a:spcAft>
+            <a:buChar char="••"/>
+          </a:pPr>
+          <a:r>
+            <a:rPr lang="fr-FR" sz="1050" kern="1200" smtClean="0">
+              <a:solidFill>
+                <a:schemeClr val="accent3">
+                  <a:lumMod val="75000"/>
+                </a:schemeClr>
+              </a:solidFill>
+            </a:rPr>
+            <a:t>Collect data</a:t>
+          </a:r>
+          <a:endParaRPr lang="fr-FR" sz="1050" kern="1200">
+            <a:solidFill>
+              <a:schemeClr val="accent3">
+                <a:lumMod val="75000"/>
+              </a:schemeClr>
+            </a:solidFill>
+          </a:endParaRPr>
+        </a:p>
+        <a:p>
+          <a:pPr marL="57150" lvl="1" indent="-57150" algn="l" defTabSz="466725">
+            <a:lnSpc>
+              <a:spcPct val="90000"/>
+            </a:lnSpc>
+            <a:spcBef>
+              <a:spcPct val="0"/>
+            </a:spcBef>
+            <a:spcAft>
+              <a:spcPct val="15000"/>
+            </a:spcAft>
+            <a:buChar char="••"/>
+          </a:pPr>
+          <a:r>
+            <a:rPr lang="fr-FR" sz="1050" kern="1200" smtClean="0">
+              <a:solidFill>
+                <a:schemeClr val="accent3">
+                  <a:lumMod val="75000"/>
+                </a:schemeClr>
+              </a:solidFill>
+            </a:rPr>
+            <a:t>Write, design and edit the IAR</a:t>
+          </a:r>
+          <a:endParaRPr lang="fr-FR" sz="1050" kern="1200">
+            <a:solidFill>
+              <a:schemeClr val="accent3">
+                <a:lumMod val="75000"/>
+              </a:schemeClr>
+            </a:solidFill>
+          </a:endParaRPr>
+        </a:p>
+        <a:p>
+          <a:pPr marL="57150" lvl="1" indent="-57150" algn="l" defTabSz="466725">
+            <a:lnSpc>
+              <a:spcPct val="90000"/>
+            </a:lnSpc>
+            <a:spcBef>
+              <a:spcPct val="0"/>
+            </a:spcBef>
+            <a:spcAft>
+              <a:spcPct val="15000"/>
+            </a:spcAft>
+            <a:buChar char="••"/>
+          </a:pPr>
+          <a:r>
+            <a:rPr lang="fr-FR" sz="1050" kern="1200" smtClean="0">
+              <a:solidFill>
+                <a:schemeClr val="accent3">
+                  <a:lumMod val="75000"/>
+                </a:schemeClr>
+              </a:solidFill>
+            </a:rPr>
+            <a:t>Present IAR project</a:t>
+          </a:r>
+          <a:endParaRPr lang="fr-FR" sz="1050" kern="1200">
+            <a:solidFill>
+              <a:schemeClr val="accent3">
+                <a:lumMod val="75000"/>
+              </a:schemeClr>
+            </a:solidFill>
+          </a:endParaRPr>
+        </a:p>
+      </dsp:txBody>
+      <dsp:txXfrm rot="5400000">
+        <a:off x="2254923" y="541526"/>
+        <a:ext cx="2095616" cy="1624583"/>
+      </dsp:txXfrm>
+    </dsp:sp>
+    <dsp:sp modelId="{21D06AF9-7B68-4C50-825D-0A7D198CBF3A}">
+      <dsp:nvSpPr>
+        <dsp:cNvPr id="0" name=""/>
+        <dsp:cNvSpPr/>
+      </dsp:nvSpPr>
+      <dsp:spPr>
+        <a:xfrm rot="16200000">
+          <a:off x="4201699" y="306010"/>
+          <a:ext cx="2707637" cy="2095616"/>
+        </a:xfrm>
+        <a:prstGeom prst="flowChartManualOperation">
+          <a:avLst/>
+        </a:prstGeom>
+        <a:solidFill>
+          <a:schemeClr val="lt1">
+            <a:hueOff val="0"/>
+            <a:satOff val="0"/>
+            <a:lumOff val="0"/>
+            <a:alphaOff val="0"/>
+          </a:schemeClr>
+        </a:solidFill>
+        <a:ln w="15875" cap="flat" cmpd="sng" algn="ctr">
+          <a:solidFill>
+            <a:schemeClr val="accent3">
+              <a:shade val="80000"/>
+              <a:hueOff val="0"/>
+              <a:satOff val="0"/>
+              <a:lumOff val="0"/>
+              <a:alphaOff val="0"/>
+            </a:schemeClr>
+          </a:solidFill>
+          <a:prstDash val="solid"/>
+        </a:ln>
+        <a:effectLst/>
+      </dsp:spPr>
+      <dsp:style>
+        <a:lnRef idx="2">
+          <a:scrgbClr r="0" g="0" b="0"/>
+        </a:lnRef>
+        <a:fillRef idx="1">
+          <a:scrgbClr r="0" g="0" b="0"/>
+        </a:fillRef>
+        <a:effectRef idx="0">
+          <a:scrgbClr r="0" g="0" b="0"/>
+        </a:effectRef>
+        <a:fontRef idx="minor">
+          <a:schemeClr val="lt1"/>
+        </a:fontRef>
+      </dsp:style>
+      <dsp:txBody>
+        <a:bodyPr spcFirstLastPara="0" vert="horz" wrap="square" lIns="88900" tIns="0" rIns="88900" bIns="0" numCol="1" spcCol="1270" anchor="t" anchorCtr="0">
+          <a:noAutofit/>
+        </a:bodyPr>
+        <a:lstStyle/>
+        <a:p>
+          <a:pPr lvl="0" algn="l" defTabSz="622300">
+            <a:lnSpc>
+              <a:spcPct val="90000"/>
+            </a:lnSpc>
+            <a:spcBef>
+              <a:spcPct val="0"/>
+            </a:spcBef>
+            <a:spcAft>
+              <a:spcPct val="35000"/>
+            </a:spcAft>
+          </a:pPr>
+          <a:r>
+            <a:rPr lang="fr-FR" sz="1400" kern="1200" smtClean="0">
+              <a:solidFill>
+                <a:schemeClr val="accent3">
+                  <a:lumMod val="75000"/>
+                </a:schemeClr>
+              </a:solidFill>
+            </a:rPr>
+            <a:t>OUTCOMES</a:t>
+          </a:r>
+          <a:endParaRPr lang="fr-FR" sz="1400" kern="1200">
+            <a:solidFill>
+              <a:schemeClr val="accent3">
+                <a:lumMod val="75000"/>
+              </a:schemeClr>
+            </a:solidFill>
+          </a:endParaRPr>
+        </a:p>
+        <a:p>
+          <a:pPr marL="57150" lvl="1" indent="-57150" algn="l" defTabSz="466725">
+            <a:lnSpc>
+              <a:spcPct val="90000"/>
+            </a:lnSpc>
+            <a:spcBef>
+              <a:spcPct val="0"/>
+            </a:spcBef>
+            <a:spcAft>
+              <a:spcPct val="15000"/>
+            </a:spcAft>
+            <a:buChar char="••"/>
+          </a:pPr>
+          <a:r>
+            <a:rPr lang="fr-FR" sz="1050" kern="1200" smtClean="0">
+              <a:solidFill>
+                <a:schemeClr val="accent3">
+                  <a:lumMod val="75000"/>
+                </a:schemeClr>
+              </a:solidFill>
+            </a:rPr>
+            <a:t>IAR</a:t>
+          </a:r>
+          <a:endParaRPr lang="fr-FR" sz="1050" kern="1200">
+            <a:solidFill>
+              <a:schemeClr val="accent3">
+                <a:lumMod val="75000"/>
+              </a:schemeClr>
+            </a:solidFill>
+          </a:endParaRPr>
+        </a:p>
+        <a:p>
+          <a:pPr marL="57150" lvl="1" indent="-57150" algn="l" defTabSz="466725">
+            <a:lnSpc>
+              <a:spcPct val="90000"/>
+            </a:lnSpc>
+            <a:spcBef>
+              <a:spcPct val="0"/>
+            </a:spcBef>
+            <a:spcAft>
+              <a:spcPct val="15000"/>
+            </a:spcAft>
+            <a:buChar char="••"/>
+          </a:pPr>
+          <a:r>
+            <a:rPr lang="fr-FR" sz="1050" kern="1200" smtClean="0">
+              <a:solidFill>
+                <a:schemeClr val="accent3">
+                  <a:lumMod val="75000"/>
+                </a:schemeClr>
+              </a:solidFill>
+            </a:rPr>
+            <a:t>Interaction with other conributors</a:t>
+          </a:r>
+          <a:endParaRPr lang="fr-FR" sz="1050" kern="1200">
+            <a:solidFill>
+              <a:schemeClr val="accent3">
+                <a:lumMod val="75000"/>
+              </a:schemeClr>
+            </a:solidFill>
+          </a:endParaRPr>
+        </a:p>
+      </dsp:txBody>
+      <dsp:txXfrm rot="5400000">
+        <a:off x="4507710" y="541526"/>
+        <a:ext cx="2095616" cy="1624583"/>
+      </dsp:txXfrm>
+    </dsp:sp>
+    <dsp:sp modelId="{F1E2BDB2-0BA9-4FD2-86F9-2CAEA5A63A20}">
+      <dsp:nvSpPr>
+        <dsp:cNvPr id="0" name=""/>
+        <dsp:cNvSpPr/>
+      </dsp:nvSpPr>
+      <dsp:spPr>
+        <a:xfrm rot="16200000">
+          <a:off x="6454487" y="306010"/>
+          <a:ext cx="2707637" cy="2095616"/>
+        </a:xfrm>
+        <a:prstGeom prst="flowChartManualOperation">
+          <a:avLst/>
+        </a:prstGeom>
+        <a:solidFill>
+          <a:schemeClr val="lt1">
+            <a:hueOff val="0"/>
+            <a:satOff val="0"/>
+            <a:lumOff val="0"/>
+            <a:alphaOff val="0"/>
+          </a:schemeClr>
+        </a:solidFill>
+        <a:ln w="15875" cap="flat" cmpd="sng" algn="ctr">
+          <a:solidFill>
+            <a:schemeClr val="accent3">
+              <a:shade val="80000"/>
+              <a:hueOff val="0"/>
+              <a:satOff val="0"/>
+              <a:lumOff val="0"/>
+              <a:alphaOff val="0"/>
+            </a:schemeClr>
+          </a:solidFill>
+          <a:prstDash val="solid"/>
+        </a:ln>
+        <a:effectLst/>
+      </dsp:spPr>
+      <dsp:style>
+        <a:lnRef idx="2">
+          <a:scrgbClr r="0" g="0" b="0"/>
+        </a:lnRef>
+        <a:fillRef idx="1">
+          <a:scrgbClr r="0" g="0" b="0"/>
+        </a:fillRef>
+        <a:effectRef idx="0">
+          <a:scrgbClr r="0" g="0" b="0"/>
+        </a:effectRef>
+        <a:fontRef idx="minor">
+          <a:schemeClr val="lt1"/>
+        </a:fontRef>
+      </dsp:style>
+      <dsp:txBody>
+        <a:bodyPr spcFirstLastPara="0" vert="horz" wrap="square" lIns="88900" tIns="0" rIns="88900" bIns="0" numCol="1" spcCol="1270" anchor="t" anchorCtr="0">
+          <a:noAutofit/>
+        </a:bodyPr>
+        <a:lstStyle/>
+        <a:p>
+          <a:pPr lvl="0" algn="l" defTabSz="622300">
+            <a:lnSpc>
+              <a:spcPct val="90000"/>
+            </a:lnSpc>
+            <a:spcBef>
+              <a:spcPct val="0"/>
+            </a:spcBef>
+            <a:spcAft>
+              <a:spcPct val="35000"/>
+            </a:spcAft>
+          </a:pPr>
+          <a:r>
+            <a:rPr lang="fr-FR" sz="1400" kern="1200" smtClean="0">
+              <a:solidFill>
+                <a:schemeClr val="accent3">
+                  <a:lumMod val="75000"/>
+                </a:schemeClr>
+              </a:solidFill>
+            </a:rPr>
+            <a:t>OUTPUTS</a:t>
+          </a:r>
+          <a:endParaRPr lang="fr-FR" sz="1400" kern="1200">
+            <a:solidFill>
+              <a:schemeClr val="accent3">
+                <a:lumMod val="75000"/>
+              </a:schemeClr>
+            </a:solidFill>
+          </a:endParaRPr>
+        </a:p>
+        <a:p>
+          <a:pPr marL="57150" lvl="1" indent="-57150" algn="l" defTabSz="466725">
+            <a:lnSpc>
+              <a:spcPct val="90000"/>
+            </a:lnSpc>
+            <a:spcBef>
+              <a:spcPct val="0"/>
+            </a:spcBef>
+            <a:spcAft>
+              <a:spcPct val="15000"/>
+            </a:spcAft>
+            <a:buChar char="••"/>
+          </a:pPr>
+          <a:r>
+            <a:rPr lang="fr-FR" sz="1050" kern="1200" smtClean="0">
+              <a:solidFill>
+                <a:schemeClr val="accent3">
+                  <a:lumMod val="75000"/>
+                </a:schemeClr>
+              </a:solidFill>
+            </a:rPr>
+            <a:t>Know about the fuel cell industry</a:t>
+          </a:r>
+          <a:endParaRPr lang="fr-FR" sz="1050" kern="1200">
+            <a:solidFill>
+              <a:schemeClr val="accent3">
+                <a:lumMod val="75000"/>
+              </a:schemeClr>
+            </a:solidFill>
+          </a:endParaRPr>
+        </a:p>
+        <a:p>
+          <a:pPr marL="114300" lvl="2" indent="-57150" algn="l" defTabSz="466725">
+            <a:lnSpc>
+              <a:spcPct val="90000"/>
+            </a:lnSpc>
+            <a:spcBef>
+              <a:spcPct val="0"/>
+            </a:spcBef>
+            <a:spcAft>
+              <a:spcPct val="15000"/>
+            </a:spcAft>
+            <a:buChar char="••"/>
+          </a:pPr>
+          <a:r>
+            <a:rPr lang="fr-FR" sz="1050" kern="1200" smtClean="0">
+              <a:solidFill>
+                <a:schemeClr val="accent3">
+                  <a:lumMod val="75000"/>
+                </a:schemeClr>
+              </a:solidFill>
+            </a:rPr>
+            <a:t>Know the state and needs of the market</a:t>
+          </a:r>
+          <a:endParaRPr lang="fr-FR" sz="1050" kern="1200">
+            <a:solidFill>
+              <a:schemeClr val="accent3">
+                <a:lumMod val="75000"/>
+              </a:schemeClr>
+            </a:solidFill>
+          </a:endParaRPr>
+        </a:p>
+        <a:p>
+          <a:pPr marL="57150" lvl="1" indent="-57150" algn="l" defTabSz="466725">
+            <a:lnSpc>
+              <a:spcPct val="90000"/>
+            </a:lnSpc>
+            <a:spcBef>
+              <a:spcPct val="0"/>
+            </a:spcBef>
+            <a:spcAft>
+              <a:spcPct val="15000"/>
+            </a:spcAft>
+            <a:buChar char="••"/>
+          </a:pPr>
+          <a:r>
+            <a:rPr lang="fr-FR" sz="1050" kern="1200" smtClean="0">
+              <a:solidFill>
+                <a:schemeClr val="accent3">
+                  <a:lumMod val="75000"/>
+                </a:schemeClr>
+              </a:solidFill>
+            </a:rPr>
+            <a:t>IAR available to everyone</a:t>
+          </a:r>
+          <a:endParaRPr lang="fr-FR" sz="1050" kern="1200">
+            <a:solidFill>
+              <a:schemeClr val="accent3">
+                <a:lumMod val="75000"/>
+              </a:schemeClr>
+            </a:solidFill>
+          </a:endParaRPr>
+        </a:p>
+        <a:p>
+          <a:pPr marL="57150" lvl="1" indent="-57150" algn="l" defTabSz="466725">
+            <a:lnSpc>
+              <a:spcPct val="90000"/>
+            </a:lnSpc>
+            <a:spcBef>
+              <a:spcPct val="0"/>
+            </a:spcBef>
+            <a:spcAft>
+              <a:spcPct val="15000"/>
+            </a:spcAft>
+            <a:buChar char="••"/>
+          </a:pPr>
+          <a:r>
+            <a:rPr lang="fr-FR" sz="1050" kern="1200" smtClean="0">
+              <a:solidFill>
+                <a:schemeClr val="accent3">
+                  <a:lumMod val="75000"/>
+                </a:schemeClr>
+              </a:solidFill>
+            </a:rPr>
+            <a:t>IAR understandable by everyone</a:t>
+          </a:r>
+          <a:endParaRPr lang="fr-FR" sz="1050" kern="1200">
+            <a:solidFill>
+              <a:schemeClr val="accent3">
+                <a:lumMod val="75000"/>
+              </a:schemeClr>
+            </a:solidFill>
+          </a:endParaRPr>
+        </a:p>
+        <a:p>
+          <a:pPr marL="57150" lvl="1" indent="-57150" algn="l" defTabSz="466725">
+            <a:lnSpc>
+              <a:spcPct val="90000"/>
+            </a:lnSpc>
+            <a:spcBef>
+              <a:spcPct val="0"/>
+            </a:spcBef>
+            <a:spcAft>
+              <a:spcPct val="15000"/>
+            </a:spcAft>
+            <a:buChar char="••"/>
+          </a:pPr>
+          <a:endParaRPr lang="fr-FR" sz="1050" kern="1200">
+            <a:solidFill>
+              <a:schemeClr val="accent3">
+                <a:lumMod val="75000"/>
+              </a:schemeClr>
+            </a:solidFill>
+          </a:endParaRPr>
+        </a:p>
+      </dsp:txBody>
+      <dsp:txXfrm rot="5400000">
+        <a:off x="6760498" y="541526"/>
+        <a:ext cx="2095616" cy="1624583"/>
+      </dsp:txXfrm>
+    </dsp:sp>
   </dsp:spTree>
 </dsp:drawing>
 </file>
@@ -3880,7 +4840,7 @@
           <a:p>
             <a:fld id="{DDCCA47B-3C97-470F-9E92-6634E455912F}" type="datetimeFigureOut">
               <a:rPr lang="en-US" smtClean="0"/>
-              <a:t>5/19/2015</a:t>
+              <a:t>5/20/2015</a:t>
             </a:fld>
             <a:endParaRPr lang="en-US"/>
           </a:p>
@@ -4458,7 +5418,7 @@
           <a:p>
             <a:fld id="{02594452-2088-46C7-8121-271356E8511E}" type="datetime1">
               <a:rPr lang="fr-FR" smtClean="0"/>
-              <a:t>19/05/2015</a:t>
+              <a:t>20/05/2015</a:t>
             </a:fld>
             <a:endParaRPr lang="fr-FR"/>
           </a:p>
@@ -4670,7 +5630,7 @@
           <a:p>
             <a:fld id="{FF739EE9-E6DE-4CFF-9ECE-0F54FDE20F4B}" type="datetime1">
               <a:rPr lang="fr-FR" smtClean="0"/>
-              <a:t>19/05/2015</a:t>
+              <a:t>20/05/2015</a:t>
             </a:fld>
             <a:endParaRPr lang="fr-FR"/>
           </a:p>
@@ -4930,7 +5890,7 @@
           <a:p>
             <a:fld id="{058B513E-FE9D-418D-A202-255A4E4C6AC5}" type="datetime1">
               <a:rPr lang="fr-FR" smtClean="0"/>
-              <a:t>19/05/2015</a:t>
+              <a:t>20/05/2015</a:t>
             </a:fld>
             <a:endParaRPr lang="fr-FR"/>
           </a:p>
@@ -5104,7 +6064,7 @@
           <a:p>
             <a:fld id="{B3951D82-E167-4565-95B5-D8341A5A6D5B}" type="datetime1">
               <a:rPr lang="fr-FR" smtClean="0"/>
-              <a:t>19/05/2015</a:t>
+              <a:t>20/05/2015</a:t>
             </a:fld>
             <a:endParaRPr lang="fr-FR"/>
           </a:p>
@@ -5451,7 +6411,7 @@
           <a:p>
             <a:fld id="{6F395423-CF2A-41A1-B998-779941211E29}" type="datetime1">
               <a:rPr lang="fr-FR" smtClean="0"/>
-              <a:t>19/05/2015</a:t>
+              <a:t>20/05/2015</a:t>
             </a:fld>
             <a:endParaRPr lang="fr-FR"/>
           </a:p>
@@ -5730,7 +6690,7 @@
           <a:p>
             <a:fld id="{7B31CB30-7913-4FD5-8453-6D9FF22AA427}" type="datetime1">
               <a:rPr lang="fr-FR" smtClean="0"/>
-              <a:t>19/05/2015</a:t>
+              <a:t>20/05/2015</a:t>
             </a:fld>
             <a:endParaRPr lang="fr-FR"/>
           </a:p>
@@ -6113,7 +7073,7 @@
           <a:p>
             <a:fld id="{8F14C0EE-E481-43F3-94DA-D1A25CEC40DE}" type="datetime1">
               <a:rPr lang="fr-FR" smtClean="0"/>
-              <a:t>19/05/2015</a:t>
+              <a:t>20/05/2015</a:t>
             </a:fld>
             <a:endParaRPr lang="fr-FR"/>
           </a:p>
@@ -6235,7 +7195,7 @@
           <a:p>
             <a:fld id="{531EB399-98EB-4874-922C-FD316CDCF690}" type="datetime1">
               <a:rPr lang="fr-FR" smtClean="0"/>
-              <a:t>19/05/2015</a:t>
+              <a:t>20/05/2015</a:t>
             </a:fld>
             <a:endParaRPr lang="fr-FR"/>
           </a:p>
@@ -6410,7 +7370,7 @@
           <a:p>
             <a:fld id="{3ECF0B9D-8152-464B-A496-6DA29EB38900}" type="datetime1">
               <a:rPr lang="fr-FR" smtClean="0"/>
-              <a:t>19/05/2015</a:t>
+              <a:t>20/05/2015</a:t>
             </a:fld>
             <a:endParaRPr lang="fr-FR"/>
           </a:p>
@@ -6768,7 +7728,7 @@
           <a:p>
             <a:fld id="{EB72BB81-321C-47C9-8EF1-F64E7E3280BC}" type="datetime1">
               <a:rPr lang="fr-FR" smtClean="0"/>
-              <a:t>19/05/2015</a:t>
+              <a:t>20/05/2015</a:t>
             </a:fld>
             <a:endParaRPr lang="fr-FR"/>
           </a:p>
@@ -7149,7 +8109,7 @@
           <a:p>
             <a:fld id="{310F2307-685A-4E72-8E0A-45F85857C52E}" type="datetime1">
               <a:rPr lang="fr-FR" smtClean="0"/>
-              <a:t>19/05/2015</a:t>
+              <a:t>20/05/2015</a:t>
             </a:fld>
             <a:endParaRPr lang="fr-FR"/>
           </a:p>
@@ -7440,7 +8400,7 @@
           <a:p>
             <a:fld id="{B82A1CD3-8443-43C6-8EE4-FA26CE5A5F83}" type="datetime1">
               <a:rPr lang="fr-FR" smtClean="0"/>
-              <a:t>19/05/2015</a:t>
+              <a:t>20/05/2015</a:t>
             </a:fld>
             <a:endParaRPr lang="fr-FR"/>
           </a:p>
@@ -9739,14 +10699,14 @@
           <p:nvPr>
             <p:extLst>
               <p:ext uri="{D42A27DB-BD31-4B8C-83A1-F6EECF244321}">
-                <p14:modId xmlns:p14="http://schemas.microsoft.com/office/powerpoint/2010/main" val="2356598327"/>
+                <p14:modId xmlns:p14="http://schemas.microsoft.com/office/powerpoint/2010/main" val="1036280830"/>
               </p:ext>
             </p:extLst>
           </p:nvPr>
         </p:nvGraphicFramePr>
         <p:xfrm>
           <a:off x="1346200" y="1964266"/>
-          <a:ext cx="8915401" cy="4129024"/>
+          <a:ext cx="9809480" cy="4129024"/>
         </p:xfrm>
         <a:graphic>
           <a:graphicData uri="http://schemas.openxmlformats.org/drawingml/2006/table">
@@ -9755,9 +10715,9 @@
                 <a:tableStyleId>{5C22544A-7EE6-4342-B048-85BDC9FD1C3A}</a:tableStyleId>
               </a:tblPr>
               <a:tblGrid>
-                <a:gridCol w="3251200"/>
-                <a:gridCol w="3149600"/>
-                <a:gridCol w="2514601"/>
+                <a:gridCol w="3577246"/>
+                <a:gridCol w="3465457"/>
+                <a:gridCol w="2766777"/>
               </a:tblGrid>
               <a:tr h="370840">
                 <a:tc>
@@ -10039,14 +10999,14 @@
                         <a:buNone/>
                       </a:pPr>
                       <a:r>
-                        <a:rPr lang="en-US" dirty="0" smtClean="0"/>
+                        <a:rPr lang="en-US" b="1" dirty="0" smtClean="0"/>
                         <a:t>Governmental</a:t>
                       </a:r>
                       <a:r>
-                        <a:rPr lang="en-US" baseline="0" dirty="0" smtClean="0"/>
+                        <a:rPr lang="en-US" b="1" baseline="0" dirty="0" smtClean="0"/>
                         <a:t> Incentives</a:t>
                       </a:r>
-                      <a:endParaRPr lang="en-US" dirty="0"/>
+                      <a:endParaRPr lang="en-US" b="1" dirty="0"/>
                     </a:p>
                   </a:txBody>
                   <a:tcPr>
@@ -10076,10 +11036,10 @@
                         <a:buNone/>
                       </a:pPr>
                       <a:r>
-                        <a:rPr lang="en-US" dirty="0" smtClean="0"/>
+                        <a:rPr lang="en-US" b="1" dirty="0" smtClean="0"/>
                         <a:t>Power Output</a:t>
                       </a:r>
-                      <a:endParaRPr lang="en-US" dirty="0"/>
+                      <a:endParaRPr lang="en-US" b="1" dirty="0"/>
                     </a:p>
                   </a:txBody>
                   <a:tcPr>
@@ -10098,10 +11058,10 @@
                         <a:buNone/>
                       </a:pPr>
                       <a:r>
-                        <a:rPr lang="en-US" dirty="0" smtClean="0"/>
+                        <a:rPr lang="en-US" b="1" dirty="0" smtClean="0"/>
                         <a:t>Region</a:t>
                       </a:r>
-                      <a:endParaRPr lang="en-US" dirty="0"/>
+                      <a:endParaRPr lang="en-US" b="1" dirty="0"/>
                     </a:p>
                   </a:txBody>
                   <a:tcPr>
@@ -10120,10 +11080,10 @@
                         <a:buNone/>
                       </a:pPr>
                       <a:r>
-                        <a:rPr lang="en-US" dirty="0" smtClean="0"/>
+                        <a:rPr lang="en-US" b="1" dirty="0" smtClean="0"/>
                         <a:t>Access to Institutions</a:t>
                       </a:r>
-                      <a:endParaRPr lang="en-US" dirty="0"/>
+                      <a:endParaRPr lang="en-US" b="1" dirty="0"/>
                     </a:p>
                   </a:txBody>
                   <a:tcPr>
@@ -10212,10 +11172,10 @@
                         <a:buNone/>
                       </a:pPr>
                       <a:r>
-                        <a:rPr lang="en-US" dirty="0" smtClean="0"/>
+                        <a:rPr lang="en-US" b="1" dirty="0" smtClean="0"/>
                         <a:t>Applications</a:t>
                       </a:r>
-                      <a:endParaRPr lang="en-US" dirty="0"/>
+                      <a:endParaRPr lang="en-US" b="1" dirty="0"/>
                     </a:p>
                   </a:txBody>
                   <a:tcPr>
@@ -10392,10 +11352,10 @@
                         <a:buNone/>
                       </a:pPr>
                       <a:r>
-                        <a:rPr lang="en-US" dirty="0" smtClean="0"/>
+                        <a:rPr lang="en-US" b="1" dirty="0" smtClean="0"/>
                         <a:t>Global Awareness</a:t>
                       </a:r>
-                      <a:endParaRPr lang="en-US" dirty="0"/>
+                      <a:endParaRPr lang="en-US" b="1" dirty="0"/>
                     </a:p>
                   </a:txBody>
                   <a:tcPr>
@@ -10514,14 +11474,14 @@
                         <a:buNone/>
                       </a:pPr>
                       <a:r>
-                        <a:rPr lang="en-US" dirty="0" smtClean="0"/>
+                        <a:rPr lang="en-US" b="1" dirty="0" smtClean="0"/>
                         <a:t>Market</a:t>
                       </a:r>
                       <a:r>
-                        <a:rPr lang="en-US" baseline="0" dirty="0" smtClean="0"/>
+                        <a:rPr lang="en-US" b="1" baseline="0" dirty="0" smtClean="0"/>
                         <a:t> Size</a:t>
                       </a:r>
-                      <a:endParaRPr lang="en-US" dirty="0"/>
+                      <a:endParaRPr lang="en-US" b="1" dirty="0"/>
                     </a:p>
                   </a:txBody>
                   <a:tcPr>
@@ -10646,10 +11606,10 @@
                         <a:buNone/>
                       </a:pPr>
                       <a:r>
-                        <a:rPr lang="en-US" dirty="0" smtClean="0"/>
+                        <a:rPr lang="en-US" b="1" dirty="0" smtClean="0"/>
                         <a:t>Law and Regulations</a:t>
                       </a:r>
-                      <a:endParaRPr lang="en-US" dirty="0"/>
+                      <a:endParaRPr lang="en-US" b="1" dirty="0"/>
                     </a:p>
                   </a:txBody>
                   <a:tcPr>
@@ -11171,7 +12131,11 @@
           <a:p>
             <a:r>
               <a:rPr lang="en-US" dirty="0" smtClean="0"/>
-              <a:t>‘Completed Tasks’ And ‘Work-in-progress’</a:t>
+              <a:t>‘LM ACTIVITIES’ </a:t>
+            </a:r>
+            <a:r>
+              <a:rPr lang="en-US" dirty="0" smtClean="0"/>
+              <a:t>And ‘Work-in-progress’</a:t>
             </a:r>
             <a:endParaRPr lang="en-US" dirty="0"/>
           </a:p>
@@ -11308,7 +12272,7 @@
           <a:p>
             <a:r>
               <a:rPr lang="en-US" dirty="0" smtClean="0"/>
-              <a:t>IAR Progress : Completed Tasks</a:t>
+              <a:t>IAR Progress : LM Activities</a:t>
             </a:r>
             <a:endParaRPr lang="en-US" dirty="0"/>
           </a:p>
@@ -11324,14 +12288,14 @@
             <p:ph idx="1"/>
             <p:extLst>
               <p:ext uri="{D42A27DB-BD31-4B8C-83A1-F6EECF244321}">
-                <p14:modId xmlns:p14="http://schemas.microsoft.com/office/powerpoint/2010/main" val="817248743"/>
+                <p14:modId xmlns:p14="http://schemas.microsoft.com/office/powerpoint/2010/main" val="2467249358"/>
               </p:ext>
             </p:extLst>
           </p:nvPr>
         </p:nvGraphicFramePr>
         <p:xfrm>
           <a:off x="1097280" y="2305907"/>
-          <a:ext cx="9613900" cy="2590800"/>
+          <a:ext cx="9613900" cy="3703320"/>
         </p:xfrm>
         <a:graphic>
           <a:graphicData uri="http://schemas.openxmlformats.org/drawingml/2006/table">
@@ -11546,8 +12510,13 @@
                       </a:pPr>
                       <a:r>
                         <a:rPr lang="en-US" sz="1400" dirty="0" smtClean="0"/>
-                        <a:t>Collect data </a:t>
+                        <a:t>Collect </a:t>
                       </a:r>
+                      <a:r>
+                        <a:rPr lang="en-US" sz="1400" dirty="0" smtClean="0"/>
+                        <a:t>data</a:t>
+                      </a:r>
+                      <a:endParaRPr lang="en-US" sz="1400" dirty="0" smtClean="0"/>
                     </a:p>
                   </a:txBody>
                   <a:tcPr/>
@@ -11559,7 +12528,7 @@
                     <a:p>
                       <a:r>
                         <a:rPr lang="en-US" sz="1400" dirty="0" smtClean="0"/>
-                        <a:t>COMPLETED</a:t>
+                        <a:t>IN PROGRESS</a:t>
                       </a:r>
                       <a:endParaRPr lang="en-US" sz="1400" dirty="0"/>
                     </a:p>
@@ -11574,13 +12543,10 @@
                     <a:lstStyle/>
                     <a:p>
                       <a:r>
-                        <a:rPr lang="en-US" sz="1400" dirty="0" smtClean="0"/>
-                        <a:t>IAR:</a:t>
+                        <a:rPr lang="en-US" sz="1400" baseline="0" dirty="0" smtClean="0"/>
+                        <a:t>Write IAR</a:t>
                       </a:r>
-                      <a:r>
-                        <a:rPr lang="en-US" sz="1400" baseline="0" dirty="0" smtClean="0"/>
-                        <a:t> Introduction</a:t>
-                      </a:r>
+                      <a:endParaRPr lang="en-US" sz="1400" baseline="0" dirty="0" smtClean="0"/>
                     </a:p>
                   </a:txBody>
                   <a:tcPr/>
@@ -11592,7 +12558,97 @@
                     <a:p>
                       <a:r>
                         <a:rPr lang="en-US" sz="1400" dirty="0" smtClean="0"/>
-                        <a:t>COMPLETED </a:t>
+                        <a:t>IN PROGRESS</a:t>
+                      </a:r>
+                      <a:endParaRPr lang="en-US" sz="1400" dirty="0"/>
+                    </a:p>
+                  </a:txBody>
+                  <a:tcPr/>
+                </a:tc>
+              </a:tr>
+              <a:tr h="370840">
+                <a:tc>
+                  <a:txBody>
+                    <a:bodyPr/>
+                    <a:lstStyle/>
+                    <a:p>
+                      <a:r>
+                        <a:rPr lang="en-US" sz="1400" baseline="0" dirty="0" smtClean="0"/>
+                        <a:t>Design IAR</a:t>
+                      </a:r>
+                      <a:endParaRPr lang="en-US" sz="1400" baseline="0" dirty="0" smtClean="0"/>
+                    </a:p>
+                  </a:txBody>
+                  <a:tcPr/>
+                </a:tc>
+                <a:tc>
+                  <a:txBody>
+                    <a:bodyPr/>
+                    <a:lstStyle/>
+                    <a:p>
+                      <a:r>
+                        <a:rPr lang="en-US" sz="1400" dirty="0" smtClean="0"/>
+                        <a:t>IN PROGRESS</a:t>
+                      </a:r>
+                      <a:endParaRPr lang="en-US" sz="1400" dirty="0"/>
+                    </a:p>
+                  </a:txBody>
+                  <a:tcPr/>
+                </a:tc>
+              </a:tr>
+              <a:tr h="370840">
+                <a:tc>
+                  <a:txBody>
+                    <a:bodyPr/>
+                    <a:lstStyle/>
+                    <a:p>
+                      <a:r>
+                        <a:rPr lang="en-US" sz="1400" baseline="0" dirty="0" smtClean="0"/>
+                        <a:t>Review and Edit IAR</a:t>
+                      </a:r>
+                      <a:endParaRPr lang="en-US" sz="1400" baseline="0" dirty="0" smtClean="0"/>
+                    </a:p>
+                  </a:txBody>
+                  <a:tcPr/>
+                </a:tc>
+                <a:tc>
+                  <a:txBody>
+                    <a:bodyPr/>
+                    <a:lstStyle/>
+                    <a:p>
+                      <a:r>
+                        <a:rPr lang="en-US" sz="1400" dirty="0" smtClean="0"/>
+                        <a:t>AWAITING</a:t>
+                      </a:r>
+                      <a:endParaRPr lang="en-US" sz="1400" dirty="0"/>
+                    </a:p>
+                  </a:txBody>
+                  <a:tcPr/>
+                </a:tc>
+              </a:tr>
+              <a:tr h="370840">
+                <a:tc>
+                  <a:txBody>
+                    <a:bodyPr/>
+                    <a:lstStyle/>
+                    <a:p>
+                      <a:r>
+                        <a:rPr lang="en-US" sz="1400" baseline="0" dirty="0" smtClean="0"/>
+                        <a:t>Present IAR</a:t>
+                      </a:r>
+                      <a:endParaRPr lang="en-US" sz="1400" baseline="0" dirty="0" smtClean="0"/>
+                    </a:p>
+                  </a:txBody>
+                  <a:tcPr/>
+                </a:tc>
+                <a:tc>
+                  <a:txBody>
+                    <a:bodyPr/>
+                    <a:lstStyle/>
+                    <a:p>
+                      <a:r>
+                        <a:rPr lang="en-US" sz="1400" dirty="0" smtClean="0"/>
+                        <a:t>AWAITING</a:t>
                       </a:r>
                       <a:endParaRPr lang="en-US" sz="1400" dirty="0"/>
                     </a:p>

</xml_diff>